<commit_message>
tercer commit del curso de capacitacion de formación dual uptx
</commit_message>
<xml_diff>
--- a/actividades/Desarrollo Web.pptx
+++ b/actividades/Desarrollo Web.pptx
@@ -9,6 +9,11 @@
     <p:sldId id="257" r:id="rId3"/>
     <p:sldId id="258" r:id="rId4"/>
     <p:sldId id="259" r:id="rId5"/>
+    <p:sldId id="260" r:id="rId6"/>
+    <p:sldId id="261" r:id="rId7"/>
+    <p:sldId id="262" r:id="rId8"/>
+    <p:sldId id="263" r:id="rId9"/>
+    <p:sldId id="264" r:id="rId10"/>
   </p:sldIdLst>
   <p:sldSz cx="12192000" cy="6858000"/>
   <p:notesSz cx="6858000" cy="9144000"/>
@@ -107,6 +112,11 @@
       </a:defRPr>
     </a:lvl9pPr>
   </p:defaultTextStyle>
+  <p:extLst>
+    <p:ext uri="{EFAFB233-063F-42B5-8137-9DF3F51BA10A}">
+      <p15:sldGuideLst xmlns:p15="http://schemas.microsoft.com/office/powerpoint/2012/main"/>
+    </p:ext>
+  </p:extLst>
 </p:presentation>
 </file>
 
@@ -259,7 +269,7 @@
           <a:p>
             <a:fld id="{93B37B95-31F0-458D-A6E3-84E44F6CE409}" type="datetimeFigureOut">
               <a:rPr lang="es-MX" smtClean="0"/>
-              <a:t>21/06/2022</a:t>
+              <a:t>22/06/2022</a:t>
             </a:fld>
             <a:endParaRPr lang="es-MX"/>
           </a:p>
@@ -459,7 +469,7 @@
           <a:p>
             <a:fld id="{93B37B95-31F0-458D-A6E3-84E44F6CE409}" type="datetimeFigureOut">
               <a:rPr lang="es-MX" smtClean="0"/>
-              <a:t>21/06/2022</a:t>
+              <a:t>22/06/2022</a:t>
             </a:fld>
             <a:endParaRPr lang="es-MX"/>
           </a:p>
@@ -669,7 +679,7 @@
           <a:p>
             <a:fld id="{93B37B95-31F0-458D-A6E3-84E44F6CE409}" type="datetimeFigureOut">
               <a:rPr lang="es-MX" smtClean="0"/>
-              <a:t>21/06/2022</a:t>
+              <a:t>22/06/2022</a:t>
             </a:fld>
             <a:endParaRPr lang="es-MX"/>
           </a:p>
@@ -869,7 +879,7 @@
           <a:p>
             <a:fld id="{93B37B95-31F0-458D-A6E3-84E44F6CE409}" type="datetimeFigureOut">
               <a:rPr lang="es-MX" smtClean="0"/>
-              <a:t>21/06/2022</a:t>
+              <a:t>22/06/2022</a:t>
             </a:fld>
             <a:endParaRPr lang="es-MX"/>
           </a:p>
@@ -1145,7 +1155,7 @@
           <a:p>
             <a:fld id="{93B37B95-31F0-458D-A6E3-84E44F6CE409}" type="datetimeFigureOut">
               <a:rPr lang="es-MX" smtClean="0"/>
-              <a:t>21/06/2022</a:t>
+              <a:t>22/06/2022</a:t>
             </a:fld>
             <a:endParaRPr lang="es-MX"/>
           </a:p>
@@ -1413,7 +1423,7 @@
           <a:p>
             <a:fld id="{93B37B95-31F0-458D-A6E3-84E44F6CE409}" type="datetimeFigureOut">
               <a:rPr lang="es-MX" smtClean="0"/>
-              <a:t>21/06/2022</a:t>
+              <a:t>22/06/2022</a:t>
             </a:fld>
             <a:endParaRPr lang="es-MX"/>
           </a:p>
@@ -1828,7 +1838,7 @@
           <a:p>
             <a:fld id="{93B37B95-31F0-458D-A6E3-84E44F6CE409}" type="datetimeFigureOut">
               <a:rPr lang="es-MX" smtClean="0"/>
-              <a:t>21/06/2022</a:t>
+              <a:t>22/06/2022</a:t>
             </a:fld>
             <a:endParaRPr lang="es-MX"/>
           </a:p>
@@ -1970,7 +1980,7 @@
           <a:p>
             <a:fld id="{93B37B95-31F0-458D-A6E3-84E44F6CE409}" type="datetimeFigureOut">
               <a:rPr lang="es-MX" smtClean="0"/>
-              <a:t>21/06/2022</a:t>
+              <a:t>22/06/2022</a:t>
             </a:fld>
             <a:endParaRPr lang="es-MX"/>
           </a:p>
@@ -2083,7 +2093,7 @@
           <a:p>
             <a:fld id="{93B37B95-31F0-458D-A6E3-84E44F6CE409}" type="datetimeFigureOut">
               <a:rPr lang="es-MX" smtClean="0"/>
-              <a:t>21/06/2022</a:t>
+              <a:t>22/06/2022</a:t>
             </a:fld>
             <a:endParaRPr lang="es-MX"/>
           </a:p>
@@ -2396,7 +2406,7 @@
           <a:p>
             <a:fld id="{93B37B95-31F0-458D-A6E3-84E44F6CE409}" type="datetimeFigureOut">
               <a:rPr lang="es-MX" smtClean="0"/>
-              <a:t>21/06/2022</a:t>
+              <a:t>22/06/2022</a:t>
             </a:fld>
             <a:endParaRPr lang="es-MX"/>
           </a:p>
@@ -2685,7 +2695,7 @@
           <a:p>
             <a:fld id="{93B37B95-31F0-458D-A6E3-84E44F6CE409}" type="datetimeFigureOut">
               <a:rPr lang="es-MX" smtClean="0"/>
-              <a:t>21/06/2022</a:t>
+              <a:t>22/06/2022</a:t>
             </a:fld>
             <a:endParaRPr lang="es-MX"/>
           </a:p>
@@ -2928,7 +2938,7 @@
           <a:p>
             <a:fld id="{93B37B95-31F0-458D-A6E3-84E44F6CE409}" type="datetimeFigureOut">
               <a:rPr lang="es-MX" smtClean="0"/>
-              <a:t>21/06/2022</a:t>
+              <a:t>22/06/2022</a:t>
             </a:fld>
             <a:endParaRPr lang="es-MX"/>
           </a:p>
@@ -3747,10 +3757,9 @@
           <a:p>
             <a:pPr lvl="1"/>
             <a:r>
-              <a:rPr lang="es-MX"/>
+              <a:rPr lang="es-MX" dirty="0"/>
               <a:t>CRUD</a:t>
             </a:r>
-            <a:endParaRPr lang="es-MX" dirty="0"/>
           </a:p>
           <a:p>
             <a:r>
@@ -3770,6 +3779,2368 @@
     <p:extLst>
       <p:ext uri="{BB962C8B-B14F-4D97-AF65-F5344CB8AC3E}">
         <p14:creationId xmlns:p14="http://schemas.microsoft.com/office/powerpoint/2010/main" val="3961785137"/>
+      </p:ext>
+    </p:extLst>
+  </p:cSld>
+  <p:clrMapOvr>
+    <a:masterClrMapping/>
+  </p:clrMapOvr>
+</p:sld>
+</file>
+
+<file path=ppt/slides/slide5.xml><?xml version="1.0" encoding="utf-8"?>
+<p:sld xmlns:a="http://schemas.openxmlformats.org/drawingml/2006/main" xmlns:r="http://schemas.openxmlformats.org/officeDocument/2006/relationships" xmlns:p="http://schemas.openxmlformats.org/presentationml/2006/main">
+  <p:cSld>
+    <p:spTree>
+      <p:nvGrpSpPr>
+        <p:cNvPr id="1" name=""/>
+        <p:cNvGrpSpPr/>
+        <p:nvPr/>
+      </p:nvGrpSpPr>
+      <p:grpSpPr>
+        <a:xfrm>
+          <a:off x="0" y="0"/>
+          <a:ext cx="0" cy="0"/>
+          <a:chOff x="0" y="0"/>
+          <a:chExt cx="0" cy="0"/>
+        </a:xfrm>
+      </p:grpSpPr>
+      <p:sp>
+        <p:nvSpPr>
+          <p:cNvPr id="2" name="Título 1">
+            <a:extLst>
+              <a:ext uri="{FF2B5EF4-FFF2-40B4-BE49-F238E27FC236}">
+                <a16:creationId xmlns:a16="http://schemas.microsoft.com/office/drawing/2014/main" id="{55800087-3CFC-5870-A15D-6A39E85AAB90}"/>
+              </a:ext>
+            </a:extLst>
+          </p:cNvPr>
+          <p:cNvSpPr>
+            <a:spLocks noGrp="1"/>
+          </p:cNvSpPr>
+          <p:nvPr>
+            <p:ph type="title"/>
+          </p:nvPr>
+        </p:nvSpPr>
+        <p:spPr/>
+        <p:txBody>
+          <a:bodyPr/>
+          <a:lstStyle/>
+          <a:p>
+            <a:r>
+              <a:rPr lang="es-MX" dirty="0"/>
+              <a:t>Diagrama de datos Sistema de </a:t>
+            </a:r>
+            <a:r>
+              <a:rPr lang="es-MX" dirty="0" err="1"/>
+              <a:t>peliculas</a:t>
+            </a:r>
+            <a:endParaRPr lang="es-MX" dirty="0"/>
+          </a:p>
+        </p:txBody>
+      </p:sp>
+      <p:sp>
+        <p:nvSpPr>
+          <p:cNvPr id="3" name="Marcador de contenido 2">
+            <a:extLst>
+              <a:ext uri="{FF2B5EF4-FFF2-40B4-BE49-F238E27FC236}">
+                <a16:creationId xmlns:a16="http://schemas.microsoft.com/office/drawing/2014/main" id="{E872BDF5-B413-9751-19B6-D1FC366E5AA3}"/>
+              </a:ext>
+            </a:extLst>
+          </p:cNvPr>
+          <p:cNvSpPr>
+            <a:spLocks noGrp="1"/>
+          </p:cNvSpPr>
+          <p:nvPr>
+            <p:ph idx="1"/>
+          </p:nvPr>
+        </p:nvSpPr>
+        <p:spPr/>
+        <p:txBody>
+          <a:bodyPr>
+            <a:normAutofit lnSpcReduction="10000"/>
+          </a:bodyPr>
+          <a:lstStyle/>
+          <a:p>
+            <a:r>
+              <a:rPr lang="es-MX" dirty="0"/>
+              <a:t>Id</a:t>
+            </a:r>
+          </a:p>
+          <a:p>
+            <a:r>
+              <a:rPr lang="es-MX" dirty="0"/>
+              <a:t>Titulo</a:t>
+            </a:r>
+          </a:p>
+          <a:p>
+            <a:r>
+              <a:rPr lang="es-MX" dirty="0"/>
+              <a:t>Poster</a:t>
+            </a:r>
+          </a:p>
+          <a:p>
+            <a:r>
+              <a:rPr lang="es-MX" dirty="0"/>
+              <a:t>Sinopsis/descripción</a:t>
+            </a:r>
+          </a:p>
+          <a:p>
+            <a:r>
+              <a:rPr lang="es-MX" dirty="0"/>
+              <a:t>Clasificación (infantil, 16+, 18+, …, A,B,C)</a:t>
+            </a:r>
+          </a:p>
+          <a:p>
+            <a:r>
+              <a:rPr lang="es-MX" dirty="0" err="1"/>
+              <a:t>Categoria</a:t>
+            </a:r>
+            <a:r>
+              <a:rPr lang="es-MX" dirty="0"/>
+              <a:t> (Ciencia ficción, animación, violencia, </a:t>
+            </a:r>
+            <a:r>
+              <a:rPr lang="es-MX" dirty="0" err="1"/>
+              <a:t>epica</a:t>
+            </a:r>
+            <a:r>
+              <a:rPr lang="es-MX" dirty="0"/>
+              <a:t>, cómica, … )</a:t>
+            </a:r>
+          </a:p>
+          <a:p>
+            <a:r>
+              <a:rPr lang="es-MX" dirty="0"/>
+              <a:t>Fecha de estreno</a:t>
+            </a:r>
+          </a:p>
+          <a:p>
+            <a:r>
+              <a:rPr lang="es-MX" dirty="0"/>
+              <a:t>fecha fin de publicación</a:t>
+            </a:r>
+          </a:p>
+          <a:p>
+            <a:r>
+              <a:rPr lang="es-MX" dirty="0"/>
+              <a:t>Horarios y venta de boletos (opcional)</a:t>
+            </a:r>
+          </a:p>
+        </p:txBody>
+      </p:sp>
+    </p:spTree>
+    <p:extLst>
+      <p:ext uri="{BB962C8B-B14F-4D97-AF65-F5344CB8AC3E}">
+        <p14:creationId xmlns:p14="http://schemas.microsoft.com/office/powerpoint/2010/main" val="2575813153"/>
+      </p:ext>
+    </p:extLst>
+  </p:cSld>
+  <p:clrMapOvr>
+    <a:masterClrMapping/>
+  </p:clrMapOvr>
+</p:sld>
+</file>
+
+<file path=ppt/slides/slide6.xml><?xml version="1.0" encoding="utf-8"?>
+<p:sld xmlns:a="http://schemas.openxmlformats.org/drawingml/2006/main" xmlns:r="http://schemas.openxmlformats.org/officeDocument/2006/relationships" xmlns:p="http://schemas.openxmlformats.org/presentationml/2006/main">
+  <p:cSld>
+    <p:spTree>
+      <p:nvGrpSpPr>
+        <p:cNvPr id="1" name=""/>
+        <p:cNvGrpSpPr/>
+        <p:nvPr/>
+      </p:nvGrpSpPr>
+      <p:grpSpPr>
+        <a:xfrm>
+          <a:off x="0" y="0"/>
+          <a:ext cx="0" cy="0"/>
+          <a:chOff x="0" y="0"/>
+          <a:chExt cx="0" cy="0"/>
+        </a:xfrm>
+      </p:grpSpPr>
+      <p:sp>
+        <p:nvSpPr>
+          <p:cNvPr id="3" name="Marcador de contenido 2">
+            <a:extLst>
+              <a:ext uri="{FF2B5EF4-FFF2-40B4-BE49-F238E27FC236}">
+                <a16:creationId xmlns:a16="http://schemas.microsoft.com/office/drawing/2014/main" id="{A5B0FED7-C729-F18A-6A95-0E61171BA308}"/>
+              </a:ext>
+            </a:extLst>
+          </p:cNvPr>
+          <p:cNvSpPr>
+            <a:spLocks noGrp="1"/>
+          </p:cNvSpPr>
+          <p:nvPr>
+            <p:ph idx="1"/>
+          </p:nvPr>
+        </p:nvSpPr>
+        <p:spPr/>
+        <p:txBody>
+          <a:bodyPr/>
+          <a:lstStyle/>
+          <a:p>
+            <a:r>
+              <a:rPr lang="es-MX" dirty="0"/>
+              <a:t>Front: HTML5, CSS3, JS, Framework Bootstrap, framework jQuery, AJAX, consumo de servicios.</a:t>
+            </a:r>
+          </a:p>
+          <a:p>
+            <a:r>
+              <a:rPr lang="es-MX" dirty="0"/>
+              <a:t>Back: PHP puro, Servicios API REST, Arquitectura de MVC, Persistencia de datos, MySQL… </a:t>
+            </a:r>
+          </a:p>
+          <a:p>
+            <a:r>
+              <a:rPr lang="es-MX" dirty="0"/>
+              <a:t>Sistema CRUD, </a:t>
+            </a:r>
+            <a:r>
+              <a:rPr lang="es-MX" dirty="0" err="1"/>
+              <a:t>Create</a:t>
+            </a:r>
+            <a:r>
+              <a:rPr lang="es-MX" dirty="0"/>
+              <a:t>, </a:t>
+            </a:r>
+            <a:r>
+              <a:rPr lang="es-MX" dirty="0" err="1"/>
+              <a:t>Read</a:t>
+            </a:r>
+            <a:r>
+              <a:rPr lang="es-MX" dirty="0"/>
+              <a:t>, </a:t>
+            </a:r>
+            <a:r>
+              <a:rPr lang="es-MX" dirty="0" err="1"/>
+              <a:t>Update</a:t>
+            </a:r>
+            <a:r>
+              <a:rPr lang="es-MX" dirty="0"/>
+              <a:t>, </a:t>
+            </a:r>
+            <a:r>
+              <a:rPr lang="es-MX" dirty="0" err="1"/>
+              <a:t>Delete</a:t>
+            </a:r>
+            <a:r>
+              <a:rPr lang="es-MX" dirty="0"/>
+              <a:t> de </a:t>
+            </a:r>
+            <a:r>
+              <a:rPr lang="es-MX" dirty="0" err="1"/>
+              <a:t>peliculas</a:t>
+            </a:r>
+            <a:endParaRPr lang="es-MX" dirty="0"/>
+          </a:p>
+        </p:txBody>
+      </p:sp>
+    </p:spTree>
+    <p:extLst>
+      <p:ext uri="{BB962C8B-B14F-4D97-AF65-F5344CB8AC3E}">
+        <p14:creationId xmlns:p14="http://schemas.microsoft.com/office/powerpoint/2010/main" val="2229865407"/>
+      </p:ext>
+    </p:extLst>
+  </p:cSld>
+  <p:clrMapOvr>
+    <a:masterClrMapping/>
+  </p:clrMapOvr>
+</p:sld>
+</file>
+
+<file path=ppt/slides/slide7.xml><?xml version="1.0" encoding="utf-8"?>
+<p:sld xmlns:a="http://schemas.openxmlformats.org/drawingml/2006/main" xmlns:r="http://schemas.openxmlformats.org/officeDocument/2006/relationships" xmlns:p="http://schemas.openxmlformats.org/presentationml/2006/main">
+  <p:cSld>
+    <p:spTree>
+      <p:nvGrpSpPr>
+        <p:cNvPr id="1" name=""/>
+        <p:cNvGrpSpPr/>
+        <p:nvPr/>
+      </p:nvGrpSpPr>
+      <p:grpSpPr>
+        <a:xfrm>
+          <a:off x="0" y="0"/>
+          <a:ext cx="0" cy="0"/>
+          <a:chOff x="0" y="0"/>
+          <a:chExt cx="0" cy="0"/>
+        </a:xfrm>
+      </p:grpSpPr>
+      <p:sp>
+        <p:nvSpPr>
+          <p:cNvPr id="2" name="Título 1">
+            <a:extLst>
+              <a:ext uri="{FF2B5EF4-FFF2-40B4-BE49-F238E27FC236}">
+                <a16:creationId xmlns:a16="http://schemas.microsoft.com/office/drawing/2014/main" id="{2DF4D1DF-3153-5CA6-E0A3-C00E627D697B}"/>
+              </a:ext>
+            </a:extLst>
+          </p:cNvPr>
+          <p:cNvSpPr>
+            <a:spLocks noGrp="1"/>
+          </p:cNvSpPr>
+          <p:nvPr>
+            <p:ph type="title"/>
+          </p:nvPr>
+        </p:nvSpPr>
+        <p:spPr/>
+        <p:txBody>
+          <a:bodyPr/>
+          <a:lstStyle/>
+          <a:p>
+            <a:r>
+              <a:rPr lang="es-MX" dirty="0"/>
+              <a:t>Mockup</a:t>
+            </a:r>
+          </a:p>
+        </p:txBody>
+      </p:sp>
+      <p:sp>
+        <p:nvSpPr>
+          <p:cNvPr id="4" name="Rectángulo: esquinas redondeadas 3">
+            <a:extLst>
+              <a:ext uri="{FF2B5EF4-FFF2-40B4-BE49-F238E27FC236}">
+                <a16:creationId xmlns:a16="http://schemas.microsoft.com/office/drawing/2014/main" id="{2DA46692-ECBA-93CB-A3B1-134066602729}"/>
+              </a:ext>
+            </a:extLst>
+          </p:cNvPr>
+          <p:cNvSpPr/>
+          <p:nvPr/>
+        </p:nvSpPr>
+        <p:spPr>
+          <a:xfrm>
+            <a:off x="931653" y="1690688"/>
+            <a:ext cx="10092905" cy="2389606"/>
+          </a:xfrm>
+          <a:prstGeom prst="roundRect">
+            <a:avLst/>
+          </a:prstGeom>
+        </p:spPr>
+        <p:style>
+          <a:lnRef idx="2">
+            <a:schemeClr val="accent1">
+              <a:shade val="50000"/>
+            </a:schemeClr>
+          </a:lnRef>
+          <a:fillRef idx="1">
+            <a:schemeClr val="accent1"/>
+          </a:fillRef>
+          <a:effectRef idx="0">
+            <a:schemeClr val="accent1"/>
+          </a:effectRef>
+          <a:fontRef idx="minor">
+            <a:schemeClr val="lt1"/>
+          </a:fontRef>
+        </p:style>
+        <p:txBody>
+          <a:bodyPr rtlCol="0" anchor="ctr"/>
+          <a:lstStyle/>
+          <a:p>
+            <a:pPr algn="ctr"/>
+            <a:endParaRPr lang="es-MX"/>
+          </a:p>
+        </p:txBody>
+      </p:sp>
+      <p:sp>
+        <p:nvSpPr>
+          <p:cNvPr id="5" name="CuadroTexto 4">
+            <a:extLst>
+              <a:ext uri="{FF2B5EF4-FFF2-40B4-BE49-F238E27FC236}">
+                <a16:creationId xmlns:a16="http://schemas.microsoft.com/office/drawing/2014/main" id="{A2DB254D-8418-728A-928E-676BF6BDC1E9}"/>
+              </a:ext>
+            </a:extLst>
+          </p:cNvPr>
+          <p:cNvSpPr txBox="1"/>
+          <p:nvPr/>
+        </p:nvSpPr>
+        <p:spPr>
+          <a:xfrm>
+            <a:off x="1406106" y="1347235"/>
+            <a:ext cx="1939442" cy="369332"/>
+          </a:xfrm>
+          <a:prstGeom prst="rect">
+            <a:avLst/>
+          </a:prstGeom>
+          <a:noFill/>
+        </p:spPr>
+        <p:txBody>
+          <a:bodyPr wrap="none" rtlCol="0">
+            <a:spAutoFit/>
+          </a:bodyPr>
+          <a:lstStyle/>
+          <a:p>
+            <a:r>
+              <a:rPr lang="es-MX" dirty="0"/>
+              <a:t>Filtro de </a:t>
+            </a:r>
+            <a:r>
+              <a:rPr lang="es-MX" dirty="0" err="1"/>
+              <a:t>busqueda</a:t>
+            </a:r>
+            <a:endParaRPr lang="es-MX" dirty="0"/>
+          </a:p>
+        </p:txBody>
+      </p:sp>
+      <p:sp>
+        <p:nvSpPr>
+          <p:cNvPr id="6" name="Rectángulo: esquinas redondeadas 5">
+            <a:extLst>
+              <a:ext uri="{FF2B5EF4-FFF2-40B4-BE49-F238E27FC236}">
+                <a16:creationId xmlns:a16="http://schemas.microsoft.com/office/drawing/2014/main" id="{9E8A0424-C19D-F132-13FD-372DDFD78B3E}"/>
+              </a:ext>
+            </a:extLst>
+          </p:cNvPr>
+          <p:cNvSpPr/>
+          <p:nvPr/>
+        </p:nvSpPr>
+        <p:spPr>
+          <a:xfrm>
+            <a:off x="931653" y="4423747"/>
+            <a:ext cx="10092905" cy="2389606"/>
+          </a:xfrm>
+          <a:prstGeom prst="roundRect">
+            <a:avLst/>
+          </a:prstGeom>
+        </p:spPr>
+        <p:style>
+          <a:lnRef idx="2">
+            <a:schemeClr val="accent1">
+              <a:shade val="50000"/>
+            </a:schemeClr>
+          </a:lnRef>
+          <a:fillRef idx="1">
+            <a:schemeClr val="accent1"/>
+          </a:fillRef>
+          <a:effectRef idx="0">
+            <a:schemeClr val="accent1"/>
+          </a:effectRef>
+          <a:fontRef idx="minor">
+            <a:schemeClr val="lt1"/>
+          </a:fontRef>
+        </p:style>
+        <p:txBody>
+          <a:bodyPr rtlCol="0" anchor="ctr"/>
+          <a:lstStyle/>
+          <a:p>
+            <a:pPr algn="ctr"/>
+            <a:endParaRPr lang="es-MX"/>
+          </a:p>
+        </p:txBody>
+      </p:sp>
+      <p:sp>
+        <p:nvSpPr>
+          <p:cNvPr id="7" name="CuadroTexto 6">
+            <a:extLst>
+              <a:ext uri="{FF2B5EF4-FFF2-40B4-BE49-F238E27FC236}">
+                <a16:creationId xmlns:a16="http://schemas.microsoft.com/office/drawing/2014/main" id="{0BE0ADDB-6686-11BD-9CD6-62B15C499912}"/>
+              </a:ext>
+            </a:extLst>
+          </p:cNvPr>
+          <p:cNvSpPr txBox="1"/>
+          <p:nvPr/>
+        </p:nvSpPr>
+        <p:spPr>
+          <a:xfrm>
+            <a:off x="1406106" y="4080294"/>
+            <a:ext cx="877869" cy="369332"/>
+          </a:xfrm>
+          <a:prstGeom prst="rect">
+            <a:avLst/>
+          </a:prstGeom>
+          <a:noFill/>
+        </p:spPr>
+        <p:txBody>
+          <a:bodyPr wrap="none" rtlCol="0">
+            <a:spAutoFit/>
+          </a:bodyPr>
+          <a:lstStyle/>
+          <a:p>
+            <a:r>
+              <a:rPr lang="es-MX" dirty="0"/>
+              <a:t>Tablero</a:t>
+            </a:r>
+          </a:p>
+        </p:txBody>
+      </p:sp>
+      <p:sp>
+        <p:nvSpPr>
+          <p:cNvPr id="8" name="Rectángulo: esquinas redondeadas 7">
+            <a:extLst>
+              <a:ext uri="{FF2B5EF4-FFF2-40B4-BE49-F238E27FC236}">
+                <a16:creationId xmlns:a16="http://schemas.microsoft.com/office/drawing/2014/main" id="{41A41A1A-146A-29A8-43D9-04C52D40240B}"/>
+              </a:ext>
+            </a:extLst>
+          </p:cNvPr>
+          <p:cNvSpPr/>
+          <p:nvPr/>
+        </p:nvSpPr>
+        <p:spPr>
+          <a:xfrm>
+            <a:off x="1406106" y="2179274"/>
+            <a:ext cx="1673524" cy="369332"/>
+          </a:xfrm>
+          <a:prstGeom prst="roundRect">
+            <a:avLst/>
+          </a:prstGeom>
+          <a:solidFill>
+            <a:schemeClr val="bg1"/>
+          </a:solidFill>
+        </p:spPr>
+        <p:style>
+          <a:lnRef idx="2">
+            <a:schemeClr val="accent1">
+              <a:shade val="50000"/>
+            </a:schemeClr>
+          </a:lnRef>
+          <a:fillRef idx="1">
+            <a:schemeClr val="accent1"/>
+          </a:fillRef>
+          <a:effectRef idx="0">
+            <a:schemeClr val="accent1"/>
+          </a:effectRef>
+          <a:fontRef idx="minor">
+            <a:schemeClr val="lt1"/>
+          </a:fontRef>
+        </p:style>
+        <p:txBody>
+          <a:bodyPr rtlCol="0" anchor="ctr"/>
+          <a:lstStyle/>
+          <a:p>
+            <a:pPr algn="ctr"/>
+            <a:r>
+              <a:rPr lang="es-MX" dirty="0">
+                <a:solidFill>
+                  <a:sysClr val="windowText" lastClr="000000"/>
+                </a:solidFill>
+              </a:rPr>
+              <a:t>Titulo</a:t>
+            </a:r>
+          </a:p>
+        </p:txBody>
+      </p:sp>
+      <p:sp>
+        <p:nvSpPr>
+          <p:cNvPr id="9" name="Rectángulo: esquinas redondeadas 8">
+            <a:extLst>
+              <a:ext uri="{FF2B5EF4-FFF2-40B4-BE49-F238E27FC236}">
+                <a16:creationId xmlns:a16="http://schemas.microsoft.com/office/drawing/2014/main" id="{DFD89E23-4CD0-CC9A-474E-1A5862A57028}"/>
+              </a:ext>
+            </a:extLst>
+          </p:cNvPr>
+          <p:cNvSpPr/>
+          <p:nvPr/>
+        </p:nvSpPr>
+        <p:spPr>
+          <a:xfrm>
+            <a:off x="3733737" y="2177670"/>
+            <a:ext cx="1673524" cy="369332"/>
+          </a:xfrm>
+          <a:prstGeom prst="roundRect">
+            <a:avLst/>
+          </a:prstGeom>
+          <a:solidFill>
+            <a:schemeClr val="bg1"/>
+          </a:solidFill>
+        </p:spPr>
+        <p:style>
+          <a:lnRef idx="2">
+            <a:schemeClr val="accent1">
+              <a:shade val="50000"/>
+            </a:schemeClr>
+          </a:lnRef>
+          <a:fillRef idx="1">
+            <a:schemeClr val="accent1"/>
+          </a:fillRef>
+          <a:effectRef idx="0">
+            <a:schemeClr val="accent1"/>
+          </a:effectRef>
+          <a:fontRef idx="minor">
+            <a:schemeClr val="lt1"/>
+          </a:fontRef>
+        </p:style>
+        <p:txBody>
+          <a:bodyPr rtlCol="0" anchor="ctr"/>
+          <a:lstStyle/>
+          <a:p>
+            <a:pPr algn="ctr"/>
+            <a:r>
+              <a:rPr lang="es-MX" dirty="0" err="1">
+                <a:solidFill>
+                  <a:sysClr val="windowText" lastClr="000000"/>
+                </a:solidFill>
+              </a:rPr>
+              <a:t>Clasificacion</a:t>
+            </a:r>
+            <a:endParaRPr lang="es-MX" dirty="0">
+              <a:solidFill>
+                <a:sysClr val="windowText" lastClr="000000"/>
+              </a:solidFill>
+            </a:endParaRPr>
+          </a:p>
+        </p:txBody>
+      </p:sp>
+      <p:sp>
+        <p:nvSpPr>
+          <p:cNvPr id="10" name="Rectángulo: esquinas redondeadas 9">
+            <a:extLst>
+              <a:ext uri="{FF2B5EF4-FFF2-40B4-BE49-F238E27FC236}">
+                <a16:creationId xmlns:a16="http://schemas.microsoft.com/office/drawing/2014/main" id="{51EF47F6-EA8F-71A8-8EEB-8CC0B9CFD0DC}"/>
+              </a:ext>
+            </a:extLst>
+          </p:cNvPr>
+          <p:cNvSpPr/>
+          <p:nvPr/>
+        </p:nvSpPr>
+        <p:spPr>
+          <a:xfrm>
+            <a:off x="6215332" y="2177670"/>
+            <a:ext cx="1673524" cy="369332"/>
+          </a:xfrm>
+          <a:prstGeom prst="roundRect">
+            <a:avLst/>
+          </a:prstGeom>
+          <a:solidFill>
+            <a:schemeClr val="bg1"/>
+          </a:solidFill>
+        </p:spPr>
+        <p:style>
+          <a:lnRef idx="2">
+            <a:schemeClr val="accent1">
+              <a:shade val="50000"/>
+            </a:schemeClr>
+          </a:lnRef>
+          <a:fillRef idx="1">
+            <a:schemeClr val="accent1"/>
+          </a:fillRef>
+          <a:effectRef idx="0">
+            <a:schemeClr val="accent1"/>
+          </a:effectRef>
+          <a:fontRef idx="minor">
+            <a:schemeClr val="lt1"/>
+          </a:fontRef>
+        </p:style>
+        <p:txBody>
+          <a:bodyPr rtlCol="0" anchor="ctr"/>
+          <a:lstStyle/>
+          <a:p>
+            <a:pPr algn="ctr"/>
+            <a:r>
+              <a:rPr lang="es-MX" dirty="0" err="1">
+                <a:solidFill>
+                  <a:sysClr val="windowText" lastClr="000000"/>
+                </a:solidFill>
+              </a:rPr>
+              <a:t>Categoria</a:t>
+            </a:r>
+            <a:endParaRPr lang="es-MX" dirty="0">
+              <a:solidFill>
+                <a:sysClr val="windowText" lastClr="000000"/>
+              </a:solidFill>
+            </a:endParaRPr>
+          </a:p>
+        </p:txBody>
+      </p:sp>
+      <p:sp>
+        <p:nvSpPr>
+          <p:cNvPr id="11" name="Rectángulo: esquinas redondeadas 10">
+            <a:extLst>
+              <a:ext uri="{FF2B5EF4-FFF2-40B4-BE49-F238E27FC236}">
+                <a16:creationId xmlns:a16="http://schemas.microsoft.com/office/drawing/2014/main" id="{4207F9B2-A669-BC9D-6C2D-D70E013655E1}"/>
+              </a:ext>
+            </a:extLst>
+          </p:cNvPr>
+          <p:cNvSpPr/>
+          <p:nvPr/>
+        </p:nvSpPr>
+        <p:spPr>
+          <a:xfrm>
+            <a:off x="8634028" y="2177670"/>
+            <a:ext cx="1847066" cy="369332"/>
+          </a:xfrm>
+          <a:prstGeom prst="roundRect">
+            <a:avLst/>
+          </a:prstGeom>
+          <a:solidFill>
+            <a:schemeClr val="bg1"/>
+          </a:solidFill>
+        </p:spPr>
+        <p:style>
+          <a:lnRef idx="2">
+            <a:schemeClr val="accent1">
+              <a:shade val="50000"/>
+            </a:schemeClr>
+          </a:lnRef>
+          <a:fillRef idx="1">
+            <a:schemeClr val="accent1"/>
+          </a:fillRef>
+          <a:effectRef idx="0">
+            <a:schemeClr val="accent1"/>
+          </a:effectRef>
+          <a:fontRef idx="minor">
+            <a:schemeClr val="lt1"/>
+          </a:fontRef>
+        </p:style>
+        <p:txBody>
+          <a:bodyPr rtlCol="0" anchor="ctr"/>
+          <a:lstStyle/>
+          <a:p>
+            <a:pPr algn="ctr"/>
+            <a:r>
+              <a:rPr lang="es-MX" dirty="0">
+                <a:solidFill>
+                  <a:sysClr val="windowText" lastClr="000000"/>
+                </a:solidFill>
+              </a:rPr>
+              <a:t>Fecha de estreno</a:t>
+            </a:r>
+          </a:p>
+        </p:txBody>
+      </p:sp>
+      <p:sp>
+        <p:nvSpPr>
+          <p:cNvPr id="13" name="Rectángulo: esquinas redondeadas 12">
+            <a:extLst>
+              <a:ext uri="{FF2B5EF4-FFF2-40B4-BE49-F238E27FC236}">
+                <a16:creationId xmlns:a16="http://schemas.microsoft.com/office/drawing/2014/main" id="{AE69BBB7-A4C6-CCD6-F9B3-3E565BE239A3}"/>
+              </a:ext>
+            </a:extLst>
+          </p:cNvPr>
+          <p:cNvSpPr/>
+          <p:nvPr/>
+        </p:nvSpPr>
+        <p:spPr>
+          <a:xfrm>
+            <a:off x="9040483" y="3567701"/>
+            <a:ext cx="1673524" cy="369332"/>
+          </a:xfrm>
+          <a:prstGeom prst="roundRect">
+            <a:avLst/>
+          </a:prstGeom>
+          <a:solidFill>
+            <a:schemeClr val="bg1"/>
+          </a:solidFill>
+        </p:spPr>
+        <p:style>
+          <a:lnRef idx="2">
+            <a:schemeClr val="accent1">
+              <a:shade val="50000"/>
+            </a:schemeClr>
+          </a:lnRef>
+          <a:fillRef idx="1">
+            <a:schemeClr val="accent1"/>
+          </a:fillRef>
+          <a:effectRef idx="0">
+            <a:schemeClr val="accent1"/>
+          </a:effectRef>
+          <a:fontRef idx="minor">
+            <a:schemeClr val="lt1"/>
+          </a:fontRef>
+        </p:style>
+        <p:txBody>
+          <a:bodyPr rtlCol="0" anchor="ctr"/>
+          <a:lstStyle/>
+          <a:p>
+            <a:pPr algn="ctr"/>
+            <a:r>
+              <a:rPr lang="es-MX" dirty="0">
+                <a:solidFill>
+                  <a:sysClr val="windowText" lastClr="000000"/>
+                </a:solidFill>
+              </a:rPr>
+              <a:t>Buscar</a:t>
+            </a:r>
+          </a:p>
+        </p:txBody>
+      </p:sp>
+      <p:graphicFrame>
+        <p:nvGraphicFramePr>
+          <p:cNvPr id="14" name="Tabla 14">
+            <a:extLst>
+              <a:ext uri="{FF2B5EF4-FFF2-40B4-BE49-F238E27FC236}">
+                <a16:creationId xmlns:a16="http://schemas.microsoft.com/office/drawing/2014/main" id="{CB44157B-C646-2A46-9D81-6CFEA43A1BDF}"/>
+              </a:ext>
+            </a:extLst>
+          </p:cNvPr>
+          <p:cNvGraphicFramePr>
+            <a:graphicFrameLocks noGrp="1"/>
+          </p:cNvGraphicFramePr>
+          <p:nvPr>
+            <p:extLst>
+              <p:ext uri="{D42A27DB-BD31-4B8C-83A1-F6EECF244321}">
+                <p14:modId xmlns:p14="http://schemas.microsoft.com/office/powerpoint/2010/main" val="761784604"/>
+              </p:ext>
+            </p:extLst>
+          </p:nvPr>
+        </p:nvGraphicFramePr>
+        <p:xfrm>
+          <a:off x="1406107" y="5467330"/>
+          <a:ext cx="9307900" cy="1010920"/>
+        </p:xfrm>
+        <a:graphic>
+          <a:graphicData uri="http://schemas.openxmlformats.org/drawingml/2006/table">
+            <a:tbl>
+              <a:tblPr firstRow="1" bandRow="1">
+                <a:tableStyleId>{5C22544A-7EE6-4342-B048-85BDC9FD1C3A}</a:tableStyleId>
+              </a:tblPr>
+              <a:tblGrid>
+                <a:gridCol w="1861580">
+                  <a:extLst>
+                    <a:ext uri="{9D8B030D-6E8A-4147-A177-3AD203B41FA5}">
+                      <a16:colId xmlns:a16="http://schemas.microsoft.com/office/drawing/2014/main" val="2004101120"/>
+                    </a:ext>
+                  </a:extLst>
+                </a:gridCol>
+                <a:gridCol w="1861580">
+                  <a:extLst>
+                    <a:ext uri="{9D8B030D-6E8A-4147-A177-3AD203B41FA5}">
+                      <a16:colId xmlns:a16="http://schemas.microsoft.com/office/drawing/2014/main" val="1052181261"/>
+                    </a:ext>
+                  </a:extLst>
+                </a:gridCol>
+                <a:gridCol w="1861580">
+                  <a:extLst>
+                    <a:ext uri="{9D8B030D-6E8A-4147-A177-3AD203B41FA5}">
+                      <a16:colId xmlns:a16="http://schemas.microsoft.com/office/drawing/2014/main" val="1146665525"/>
+                    </a:ext>
+                  </a:extLst>
+                </a:gridCol>
+                <a:gridCol w="1861580">
+                  <a:extLst>
+                    <a:ext uri="{9D8B030D-6E8A-4147-A177-3AD203B41FA5}">
+                      <a16:colId xmlns:a16="http://schemas.microsoft.com/office/drawing/2014/main" val="1943373030"/>
+                    </a:ext>
+                  </a:extLst>
+                </a:gridCol>
+                <a:gridCol w="1861580">
+                  <a:extLst>
+                    <a:ext uri="{9D8B030D-6E8A-4147-A177-3AD203B41FA5}">
+                      <a16:colId xmlns:a16="http://schemas.microsoft.com/office/drawing/2014/main" val="916412137"/>
+                    </a:ext>
+                  </a:extLst>
+                </a:gridCol>
+              </a:tblGrid>
+              <a:tr h="370840">
+                <a:tc>
+                  <a:txBody>
+                    <a:bodyPr/>
+                    <a:lstStyle/>
+                    <a:p>
+                      <a:r>
+                        <a:rPr lang="es-MX" dirty="0"/>
+                        <a:t>ID</a:t>
+                      </a:r>
+                    </a:p>
+                  </a:txBody>
+                  <a:tcPr/>
+                </a:tc>
+                <a:tc>
+                  <a:txBody>
+                    <a:bodyPr/>
+                    <a:lstStyle/>
+                    <a:p>
+                      <a:r>
+                        <a:rPr lang="es-MX" dirty="0" err="1"/>
+                        <a:t>Pelicula</a:t>
+                      </a:r>
+                      <a:endParaRPr lang="es-MX" dirty="0"/>
+                    </a:p>
+                  </a:txBody>
+                  <a:tcPr/>
+                </a:tc>
+                <a:tc>
+                  <a:txBody>
+                    <a:bodyPr/>
+                    <a:lstStyle/>
+                    <a:p>
+                      <a:r>
+                        <a:rPr lang="es-MX" dirty="0"/>
+                        <a:t>Fecha de </a:t>
+                      </a:r>
+                      <a:r>
+                        <a:rPr lang="es-MX" dirty="0" err="1"/>
+                        <a:t>estrono</a:t>
+                      </a:r>
+                      <a:endParaRPr lang="es-MX" dirty="0"/>
+                    </a:p>
+                  </a:txBody>
+                  <a:tcPr/>
+                </a:tc>
+                <a:tc>
+                  <a:txBody>
+                    <a:bodyPr/>
+                    <a:lstStyle/>
+                    <a:p>
+                      <a:r>
+                        <a:rPr lang="es-MX" dirty="0"/>
+                        <a:t>Clasificación/</a:t>
+                      </a:r>
+                      <a:r>
+                        <a:rPr lang="es-MX" dirty="0" err="1"/>
+                        <a:t>categoria</a:t>
+                      </a:r>
+                      <a:endParaRPr lang="es-MX" dirty="0"/>
+                    </a:p>
+                  </a:txBody>
+                  <a:tcPr/>
+                </a:tc>
+                <a:tc>
+                  <a:txBody>
+                    <a:bodyPr/>
+                    <a:lstStyle/>
+                    <a:p>
+                      <a:r>
+                        <a:rPr lang="es-MX" dirty="0"/>
+                        <a:t>Operaciones</a:t>
+                      </a:r>
+                    </a:p>
+                  </a:txBody>
+                  <a:tcPr/>
+                </a:tc>
+                <a:extLst>
+                  <a:ext uri="{0D108BD9-81ED-4DB2-BD59-A6C34878D82A}">
+                    <a16:rowId xmlns:a16="http://schemas.microsoft.com/office/drawing/2014/main" val="1659911170"/>
+                  </a:ext>
+                </a:extLst>
+              </a:tr>
+              <a:tr h="370840">
+                <a:tc>
+                  <a:txBody>
+                    <a:bodyPr/>
+                    <a:lstStyle/>
+                    <a:p>
+                      <a:endParaRPr lang="es-MX"/>
+                    </a:p>
+                  </a:txBody>
+                  <a:tcPr/>
+                </a:tc>
+                <a:tc>
+                  <a:txBody>
+                    <a:bodyPr/>
+                    <a:lstStyle/>
+                    <a:p>
+                      <a:endParaRPr lang="es-MX"/>
+                    </a:p>
+                  </a:txBody>
+                  <a:tcPr/>
+                </a:tc>
+                <a:tc>
+                  <a:txBody>
+                    <a:bodyPr/>
+                    <a:lstStyle/>
+                    <a:p>
+                      <a:endParaRPr lang="es-MX"/>
+                    </a:p>
+                  </a:txBody>
+                  <a:tcPr/>
+                </a:tc>
+                <a:tc>
+                  <a:txBody>
+                    <a:bodyPr/>
+                    <a:lstStyle/>
+                    <a:p>
+                      <a:endParaRPr lang="es-MX"/>
+                    </a:p>
+                  </a:txBody>
+                  <a:tcPr/>
+                </a:tc>
+                <a:tc>
+                  <a:txBody>
+                    <a:bodyPr/>
+                    <a:lstStyle/>
+                    <a:p>
+                      <a:endParaRPr lang="es-MX" dirty="0"/>
+                    </a:p>
+                  </a:txBody>
+                  <a:tcPr/>
+                </a:tc>
+                <a:extLst>
+                  <a:ext uri="{0D108BD9-81ED-4DB2-BD59-A6C34878D82A}">
+                    <a16:rowId xmlns:a16="http://schemas.microsoft.com/office/drawing/2014/main" val="2439245188"/>
+                  </a:ext>
+                </a:extLst>
+              </a:tr>
+            </a:tbl>
+          </a:graphicData>
+        </a:graphic>
+      </p:graphicFrame>
+      <p:sp>
+        <p:nvSpPr>
+          <p:cNvPr id="15" name="Rectángulo: esquinas redondeadas 14">
+            <a:extLst>
+              <a:ext uri="{FF2B5EF4-FFF2-40B4-BE49-F238E27FC236}">
+                <a16:creationId xmlns:a16="http://schemas.microsoft.com/office/drawing/2014/main" id="{0888AAB7-99B0-CA6F-8A2B-BCCFC21B7181}"/>
+              </a:ext>
+            </a:extLst>
+          </p:cNvPr>
+          <p:cNvSpPr/>
+          <p:nvPr/>
+        </p:nvSpPr>
+        <p:spPr>
+          <a:xfrm>
+            <a:off x="9040483" y="4786661"/>
+            <a:ext cx="1673524" cy="369332"/>
+          </a:xfrm>
+          <a:prstGeom prst="roundRect">
+            <a:avLst/>
+          </a:prstGeom>
+          <a:solidFill>
+            <a:schemeClr val="bg1"/>
+          </a:solidFill>
+        </p:spPr>
+        <p:style>
+          <a:lnRef idx="2">
+            <a:schemeClr val="accent1">
+              <a:shade val="50000"/>
+            </a:schemeClr>
+          </a:lnRef>
+          <a:fillRef idx="1">
+            <a:schemeClr val="accent1"/>
+          </a:fillRef>
+          <a:effectRef idx="0">
+            <a:schemeClr val="accent1"/>
+          </a:effectRef>
+          <a:fontRef idx="minor">
+            <a:schemeClr val="lt1"/>
+          </a:fontRef>
+        </p:style>
+        <p:txBody>
+          <a:bodyPr rtlCol="0" anchor="ctr"/>
+          <a:lstStyle/>
+          <a:p>
+            <a:pPr algn="ctr"/>
+            <a:r>
+              <a:rPr lang="es-MX" dirty="0">
+                <a:solidFill>
+                  <a:sysClr val="windowText" lastClr="000000"/>
+                </a:solidFill>
+              </a:rPr>
+              <a:t>Agregar</a:t>
+            </a:r>
+          </a:p>
+        </p:txBody>
+      </p:sp>
+    </p:spTree>
+    <p:extLst>
+      <p:ext uri="{BB962C8B-B14F-4D97-AF65-F5344CB8AC3E}">
+        <p14:creationId xmlns:p14="http://schemas.microsoft.com/office/powerpoint/2010/main" val="3430521847"/>
+      </p:ext>
+    </p:extLst>
+  </p:cSld>
+  <p:clrMapOvr>
+    <a:masterClrMapping/>
+  </p:clrMapOvr>
+</p:sld>
+</file>
+
+<file path=ppt/slides/slide8.xml><?xml version="1.0" encoding="utf-8"?>
+<p:sld xmlns:a="http://schemas.openxmlformats.org/drawingml/2006/main" xmlns:r="http://schemas.openxmlformats.org/officeDocument/2006/relationships" xmlns:p="http://schemas.openxmlformats.org/presentationml/2006/main">
+  <p:cSld>
+    <p:spTree>
+      <p:nvGrpSpPr>
+        <p:cNvPr id="1" name=""/>
+        <p:cNvGrpSpPr/>
+        <p:nvPr/>
+      </p:nvGrpSpPr>
+      <p:grpSpPr>
+        <a:xfrm>
+          <a:off x="0" y="0"/>
+          <a:ext cx="0" cy="0"/>
+          <a:chOff x="0" y="0"/>
+          <a:chExt cx="0" cy="0"/>
+        </a:xfrm>
+      </p:grpSpPr>
+      <p:sp>
+        <p:nvSpPr>
+          <p:cNvPr id="3" name="Marcador de contenido 2">
+            <a:extLst>
+              <a:ext uri="{FF2B5EF4-FFF2-40B4-BE49-F238E27FC236}">
+                <a16:creationId xmlns:a16="http://schemas.microsoft.com/office/drawing/2014/main" id="{27FF86CF-421B-DDE3-6A4C-EF1481598154}"/>
+              </a:ext>
+            </a:extLst>
+          </p:cNvPr>
+          <p:cNvSpPr>
+            <a:spLocks noGrp="1"/>
+          </p:cNvSpPr>
+          <p:nvPr>
+            <p:ph idx="1"/>
+          </p:nvPr>
+        </p:nvSpPr>
+        <p:spPr>
+          <a:xfrm>
+            <a:off x="751935" y="514410"/>
+            <a:ext cx="10515600" cy="4351338"/>
+          </a:xfrm>
+        </p:spPr>
+        <p:txBody>
+          <a:bodyPr/>
+          <a:lstStyle/>
+          <a:p>
+            <a:r>
+              <a:rPr lang="es-MX" dirty="0"/>
+              <a:t>Tablero opción 2</a:t>
+            </a:r>
+          </a:p>
+        </p:txBody>
+      </p:sp>
+      <p:sp>
+        <p:nvSpPr>
+          <p:cNvPr id="4" name="Rectángulo: esquinas redondeadas 3">
+            <a:extLst>
+              <a:ext uri="{FF2B5EF4-FFF2-40B4-BE49-F238E27FC236}">
+                <a16:creationId xmlns:a16="http://schemas.microsoft.com/office/drawing/2014/main" id="{30F64DD4-11F2-618A-8EFB-C3ADB5A6E9F3}"/>
+              </a:ext>
+            </a:extLst>
+          </p:cNvPr>
+          <p:cNvSpPr/>
+          <p:nvPr/>
+        </p:nvSpPr>
+        <p:spPr>
+          <a:xfrm>
+            <a:off x="751935" y="1311216"/>
+            <a:ext cx="2303253" cy="2337758"/>
+          </a:xfrm>
+          <a:prstGeom prst="roundRect">
+            <a:avLst/>
+          </a:prstGeom>
+        </p:spPr>
+        <p:style>
+          <a:lnRef idx="2">
+            <a:schemeClr val="accent1">
+              <a:shade val="50000"/>
+            </a:schemeClr>
+          </a:lnRef>
+          <a:fillRef idx="1">
+            <a:schemeClr val="accent1"/>
+          </a:fillRef>
+          <a:effectRef idx="0">
+            <a:schemeClr val="accent1"/>
+          </a:effectRef>
+          <a:fontRef idx="minor">
+            <a:schemeClr val="lt1"/>
+          </a:fontRef>
+        </p:style>
+        <p:txBody>
+          <a:bodyPr rtlCol="0" anchor="ctr"/>
+          <a:lstStyle/>
+          <a:p>
+            <a:pPr algn="ctr"/>
+            <a:endParaRPr lang="es-MX"/>
+          </a:p>
+        </p:txBody>
+      </p:sp>
+      <p:sp>
+        <p:nvSpPr>
+          <p:cNvPr id="5" name="Rectángulo: esquinas redondeadas 4">
+            <a:extLst>
+              <a:ext uri="{FF2B5EF4-FFF2-40B4-BE49-F238E27FC236}">
+                <a16:creationId xmlns:a16="http://schemas.microsoft.com/office/drawing/2014/main" id="{30C3CDFC-950C-69A3-C94E-D3A5EEC67435}"/>
+              </a:ext>
+            </a:extLst>
+          </p:cNvPr>
+          <p:cNvSpPr/>
+          <p:nvPr/>
+        </p:nvSpPr>
+        <p:spPr>
+          <a:xfrm>
+            <a:off x="846827" y="3074818"/>
+            <a:ext cx="2139350" cy="369332"/>
+          </a:xfrm>
+          <a:prstGeom prst="roundRect">
+            <a:avLst/>
+          </a:prstGeom>
+          <a:solidFill>
+            <a:schemeClr val="bg1"/>
+          </a:solidFill>
+        </p:spPr>
+        <p:style>
+          <a:lnRef idx="2">
+            <a:schemeClr val="accent1">
+              <a:shade val="50000"/>
+            </a:schemeClr>
+          </a:lnRef>
+          <a:fillRef idx="1">
+            <a:schemeClr val="accent1"/>
+          </a:fillRef>
+          <a:effectRef idx="0">
+            <a:schemeClr val="accent1"/>
+          </a:effectRef>
+          <a:fontRef idx="minor">
+            <a:schemeClr val="lt1"/>
+          </a:fontRef>
+        </p:style>
+        <p:txBody>
+          <a:bodyPr rtlCol="0" anchor="ctr"/>
+          <a:lstStyle/>
+          <a:p>
+            <a:pPr algn="ctr"/>
+            <a:r>
+              <a:rPr lang="es-MX" dirty="0">
+                <a:solidFill>
+                  <a:sysClr val="windowText" lastClr="000000"/>
+                </a:solidFill>
+              </a:rPr>
+              <a:t>Película ….. Ver más</a:t>
+            </a:r>
+          </a:p>
+        </p:txBody>
+      </p:sp>
+      <p:pic>
+        <p:nvPicPr>
+          <p:cNvPr id="7" name="Imagen 6" descr="Texto&#10;&#10;Descripción generada automáticamente con confianza media">
+            <a:extLst>
+              <a:ext uri="{FF2B5EF4-FFF2-40B4-BE49-F238E27FC236}">
+                <a16:creationId xmlns:a16="http://schemas.microsoft.com/office/drawing/2014/main" id="{C3C62851-C3D8-3E07-5370-AA70EA5B0EFD}"/>
+              </a:ext>
+            </a:extLst>
+          </p:cNvPr>
+          <p:cNvPicPr>
+            <a:picLocks noChangeAspect="1"/>
+          </p:cNvPicPr>
+          <p:nvPr/>
+        </p:nvPicPr>
+        <p:blipFill>
+          <a:blip r:embed="rId2">
+            <a:extLst>
+              <a:ext uri="{28A0092B-C50C-407E-A947-70E740481C1C}">
+                <a14:useLocalDpi xmlns:a14="http://schemas.microsoft.com/office/drawing/2010/main" val="0"/>
+              </a:ext>
+            </a:extLst>
+          </a:blip>
+          <a:stretch>
+            <a:fillRect/>
+          </a:stretch>
+        </p:blipFill>
+        <p:spPr>
+          <a:xfrm>
+            <a:off x="873244" y="1465364"/>
+            <a:ext cx="2086515" cy="1524015"/>
+          </a:xfrm>
+          <a:prstGeom prst="rect">
+            <a:avLst/>
+          </a:prstGeom>
+        </p:spPr>
+      </p:pic>
+      <p:sp>
+        <p:nvSpPr>
+          <p:cNvPr id="8" name="Rectángulo: esquinas redondeadas 7">
+            <a:extLst>
+              <a:ext uri="{FF2B5EF4-FFF2-40B4-BE49-F238E27FC236}">
+                <a16:creationId xmlns:a16="http://schemas.microsoft.com/office/drawing/2014/main" id="{40000BE3-C521-3442-1252-EB52914C2953}"/>
+              </a:ext>
+            </a:extLst>
+          </p:cNvPr>
+          <p:cNvSpPr/>
+          <p:nvPr/>
+        </p:nvSpPr>
+        <p:spPr>
+          <a:xfrm>
+            <a:off x="3742426" y="1292836"/>
+            <a:ext cx="2303253" cy="2337758"/>
+          </a:xfrm>
+          <a:prstGeom prst="roundRect">
+            <a:avLst/>
+          </a:prstGeom>
+        </p:spPr>
+        <p:style>
+          <a:lnRef idx="2">
+            <a:schemeClr val="accent1">
+              <a:shade val="50000"/>
+            </a:schemeClr>
+          </a:lnRef>
+          <a:fillRef idx="1">
+            <a:schemeClr val="accent1"/>
+          </a:fillRef>
+          <a:effectRef idx="0">
+            <a:schemeClr val="accent1"/>
+          </a:effectRef>
+          <a:fontRef idx="minor">
+            <a:schemeClr val="lt1"/>
+          </a:fontRef>
+        </p:style>
+        <p:txBody>
+          <a:bodyPr rtlCol="0" anchor="ctr"/>
+          <a:lstStyle/>
+          <a:p>
+            <a:pPr algn="ctr"/>
+            <a:endParaRPr lang="es-MX"/>
+          </a:p>
+        </p:txBody>
+      </p:sp>
+      <p:sp>
+        <p:nvSpPr>
+          <p:cNvPr id="9" name="Rectángulo: esquinas redondeadas 8">
+            <a:extLst>
+              <a:ext uri="{FF2B5EF4-FFF2-40B4-BE49-F238E27FC236}">
+                <a16:creationId xmlns:a16="http://schemas.microsoft.com/office/drawing/2014/main" id="{EB233592-06D9-5BDC-3B61-BF22C4C3225E}"/>
+              </a:ext>
+            </a:extLst>
+          </p:cNvPr>
+          <p:cNvSpPr/>
+          <p:nvPr/>
+        </p:nvSpPr>
+        <p:spPr>
+          <a:xfrm>
+            <a:off x="3837318" y="3056438"/>
+            <a:ext cx="2139350" cy="369332"/>
+          </a:xfrm>
+          <a:prstGeom prst="roundRect">
+            <a:avLst/>
+          </a:prstGeom>
+          <a:solidFill>
+            <a:schemeClr val="bg1"/>
+          </a:solidFill>
+        </p:spPr>
+        <p:style>
+          <a:lnRef idx="2">
+            <a:schemeClr val="accent1">
+              <a:shade val="50000"/>
+            </a:schemeClr>
+          </a:lnRef>
+          <a:fillRef idx="1">
+            <a:schemeClr val="accent1"/>
+          </a:fillRef>
+          <a:effectRef idx="0">
+            <a:schemeClr val="accent1"/>
+          </a:effectRef>
+          <a:fontRef idx="minor">
+            <a:schemeClr val="lt1"/>
+          </a:fontRef>
+        </p:style>
+        <p:txBody>
+          <a:bodyPr rtlCol="0" anchor="ctr"/>
+          <a:lstStyle/>
+          <a:p>
+            <a:pPr algn="ctr"/>
+            <a:r>
+              <a:rPr lang="es-MX" dirty="0">
+                <a:solidFill>
+                  <a:sysClr val="windowText" lastClr="000000"/>
+                </a:solidFill>
+              </a:rPr>
+              <a:t>Película ….. Ver más</a:t>
+            </a:r>
+          </a:p>
+        </p:txBody>
+      </p:sp>
+      <p:pic>
+        <p:nvPicPr>
+          <p:cNvPr id="10" name="Imagen 9" descr="Texto&#10;&#10;Descripción generada automáticamente con confianza media">
+            <a:extLst>
+              <a:ext uri="{FF2B5EF4-FFF2-40B4-BE49-F238E27FC236}">
+                <a16:creationId xmlns:a16="http://schemas.microsoft.com/office/drawing/2014/main" id="{E7F1D23D-0E72-862D-44F4-4E43D51E2A6B}"/>
+              </a:ext>
+            </a:extLst>
+          </p:cNvPr>
+          <p:cNvPicPr>
+            <a:picLocks noChangeAspect="1"/>
+          </p:cNvPicPr>
+          <p:nvPr/>
+        </p:nvPicPr>
+        <p:blipFill>
+          <a:blip r:embed="rId2">
+            <a:extLst>
+              <a:ext uri="{28A0092B-C50C-407E-A947-70E740481C1C}">
+                <a14:useLocalDpi xmlns:a14="http://schemas.microsoft.com/office/drawing/2010/main" val="0"/>
+              </a:ext>
+            </a:extLst>
+          </a:blip>
+          <a:stretch>
+            <a:fillRect/>
+          </a:stretch>
+        </p:blipFill>
+        <p:spPr>
+          <a:xfrm>
+            <a:off x="3863735" y="1446984"/>
+            <a:ext cx="2086515" cy="1524015"/>
+          </a:xfrm>
+          <a:prstGeom prst="rect">
+            <a:avLst/>
+          </a:prstGeom>
+        </p:spPr>
+      </p:pic>
+      <p:sp>
+        <p:nvSpPr>
+          <p:cNvPr id="11" name="Rectángulo: esquinas redondeadas 10">
+            <a:extLst>
+              <a:ext uri="{FF2B5EF4-FFF2-40B4-BE49-F238E27FC236}">
+                <a16:creationId xmlns:a16="http://schemas.microsoft.com/office/drawing/2014/main" id="{2C93D2C5-2168-5158-AE7E-6D3538E1689E}"/>
+              </a:ext>
+            </a:extLst>
+          </p:cNvPr>
+          <p:cNvSpPr/>
+          <p:nvPr/>
+        </p:nvSpPr>
+        <p:spPr>
+          <a:xfrm>
+            <a:off x="6614753" y="1292836"/>
+            <a:ext cx="2303253" cy="2337758"/>
+          </a:xfrm>
+          <a:prstGeom prst="roundRect">
+            <a:avLst/>
+          </a:prstGeom>
+        </p:spPr>
+        <p:style>
+          <a:lnRef idx="2">
+            <a:schemeClr val="accent1">
+              <a:shade val="50000"/>
+            </a:schemeClr>
+          </a:lnRef>
+          <a:fillRef idx="1">
+            <a:schemeClr val="accent1"/>
+          </a:fillRef>
+          <a:effectRef idx="0">
+            <a:schemeClr val="accent1"/>
+          </a:effectRef>
+          <a:fontRef idx="minor">
+            <a:schemeClr val="lt1"/>
+          </a:fontRef>
+        </p:style>
+        <p:txBody>
+          <a:bodyPr rtlCol="0" anchor="ctr"/>
+          <a:lstStyle/>
+          <a:p>
+            <a:pPr algn="ctr"/>
+            <a:endParaRPr lang="es-MX"/>
+          </a:p>
+        </p:txBody>
+      </p:sp>
+      <p:sp>
+        <p:nvSpPr>
+          <p:cNvPr id="12" name="Rectángulo: esquinas redondeadas 11">
+            <a:extLst>
+              <a:ext uri="{FF2B5EF4-FFF2-40B4-BE49-F238E27FC236}">
+                <a16:creationId xmlns:a16="http://schemas.microsoft.com/office/drawing/2014/main" id="{C56FD2A5-95AD-2EEE-8CF2-16C0AD2A800D}"/>
+              </a:ext>
+            </a:extLst>
+          </p:cNvPr>
+          <p:cNvSpPr/>
+          <p:nvPr/>
+        </p:nvSpPr>
+        <p:spPr>
+          <a:xfrm>
+            <a:off x="6709645" y="3056438"/>
+            <a:ext cx="2139350" cy="369332"/>
+          </a:xfrm>
+          <a:prstGeom prst="roundRect">
+            <a:avLst/>
+          </a:prstGeom>
+          <a:solidFill>
+            <a:schemeClr val="bg1"/>
+          </a:solidFill>
+        </p:spPr>
+        <p:style>
+          <a:lnRef idx="2">
+            <a:schemeClr val="accent1">
+              <a:shade val="50000"/>
+            </a:schemeClr>
+          </a:lnRef>
+          <a:fillRef idx="1">
+            <a:schemeClr val="accent1"/>
+          </a:fillRef>
+          <a:effectRef idx="0">
+            <a:schemeClr val="accent1"/>
+          </a:effectRef>
+          <a:fontRef idx="minor">
+            <a:schemeClr val="lt1"/>
+          </a:fontRef>
+        </p:style>
+        <p:txBody>
+          <a:bodyPr rtlCol="0" anchor="ctr"/>
+          <a:lstStyle/>
+          <a:p>
+            <a:pPr algn="ctr"/>
+            <a:r>
+              <a:rPr lang="es-MX" dirty="0">
+                <a:solidFill>
+                  <a:sysClr val="windowText" lastClr="000000"/>
+                </a:solidFill>
+              </a:rPr>
+              <a:t>Película ….. Ver más</a:t>
+            </a:r>
+          </a:p>
+        </p:txBody>
+      </p:sp>
+      <p:pic>
+        <p:nvPicPr>
+          <p:cNvPr id="13" name="Imagen 12" descr="Texto&#10;&#10;Descripción generada automáticamente con confianza media">
+            <a:extLst>
+              <a:ext uri="{FF2B5EF4-FFF2-40B4-BE49-F238E27FC236}">
+                <a16:creationId xmlns:a16="http://schemas.microsoft.com/office/drawing/2014/main" id="{50155672-71E4-4B9D-8A28-9B4E9D2FF465}"/>
+              </a:ext>
+            </a:extLst>
+          </p:cNvPr>
+          <p:cNvPicPr>
+            <a:picLocks noChangeAspect="1"/>
+          </p:cNvPicPr>
+          <p:nvPr/>
+        </p:nvPicPr>
+        <p:blipFill>
+          <a:blip r:embed="rId2">
+            <a:extLst>
+              <a:ext uri="{28A0092B-C50C-407E-A947-70E740481C1C}">
+                <a14:useLocalDpi xmlns:a14="http://schemas.microsoft.com/office/drawing/2010/main" val="0"/>
+              </a:ext>
+            </a:extLst>
+          </a:blip>
+          <a:stretch>
+            <a:fillRect/>
+          </a:stretch>
+        </p:blipFill>
+        <p:spPr>
+          <a:xfrm>
+            <a:off x="6736062" y="1446984"/>
+            <a:ext cx="2086515" cy="1524015"/>
+          </a:xfrm>
+          <a:prstGeom prst="rect">
+            <a:avLst/>
+          </a:prstGeom>
+        </p:spPr>
+      </p:pic>
+      <p:sp>
+        <p:nvSpPr>
+          <p:cNvPr id="14" name="Rectángulo: esquinas redondeadas 13">
+            <a:extLst>
+              <a:ext uri="{FF2B5EF4-FFF2-40B4-BE49-F238E27FC236}">
+                <a16:creationId xmlns:a16="http://schemas.microsoft.com/office/drawing/2014/main" id="{E18E5DD5-FC26-C4B7-3FC5-3CA88006A9AC}"/>
+              </a:ext>
+            </a:extLst>
+          </p:cNvPr>
+          <p:cNvSpPr/>
+          <p:nvPr/>
+        </p:nvSpPr>
+        <p:spPr>
+          <a:xfrm>
+            <a:off x="9217323" y="1292836"/>
+            <a:ext cx="2303253" cy="2337758"/>
+          </a:xfrm>
+          <a:prstGeom prst="roundRect">
+            <a:avLst/>
+          </a:prstGeom>
+        </p:spPr>
+        <p:style>
+          <a:lnRef idx="2">
+            <a:schemeClr val="accent1">
+              <a:shade val="50000"/>
+            </a:schemeClr>
+          </a:lnRef>
+          <a:fillRef idx="1">
+            <a:schemeClr val="accent1"/>
+          </a:fillRef>
+          <a:effectRef idx="0">
+            <a:schemeClr val="accent1"/>
+          </a:effectRef>
+          <a:fontRef idx="minor">
+            <a:schemeClr val="lt1"/>
+          </a:fontRef>
+        </p:style>
+        <p:txBody>
+          <a:bodyPr rtlCol="0" anchor="ctr"/>
+          <a:lstStyle/>
+          <a:p>
+            <a:pPr algn="ctr"/>
+            <a:endParaRPr lang="es-MX"/>
+          </a:p>
+        </p:txBody>
+      </p:sp>
+      <p:sp>
+        <p:nvSpPr>
+          <p:cNvPr id="15" name="Rectángulo: esquinas redondeadas 14">
+            <a:extLst>
+              <a:ext uri="{FF2B5EF4-FFF2-40B4-BE49-F238E27FC236}">
+                <a16:creationId xmlns:a16="http://schemas.microsoft.com/office/drawing/2014/main" id="{3954E4BB-2669-2B60-99EB-9D6F41780713}"/>
+              </a:ext>
+            </a:extLst>
+          </p:cNvPr>
+          <p:cNvSpPr/>
+          <p:nvPr/>
+        </p:nvSpPr>
+        <p:spPr>
+          <a:xfrm>
+            <a:off x="9299276" y="3074818"/>
+            <a:ext cx="2139350" cy="369332"/>
+          </a:xfrm>
+          <a:prstGeom prst="roundRect">
+            <a:avLst/>
+          </a:prstGeom>
+          <a:solidFill>
+            <a:schemeClr val="bg1"/>
+          </a:solidFill>
+        </p:spPr>
+        <p:style>
+          <a:lnRef idx="2">
+            <a:schemeClr val="accent1">
+              <a:shade val="50000"/>
+            </a:schemeClr>
+          </a:lnRef>
+          <a:fillRef idx="1">
+            <a:schemeClr val="accent1"/>
+          </a:fillRef>
+          <a:effectRef idx="0">
+            <a:schemeClr val="accent1"/>
+          </a:effectRef>
+          <a:fontRef idx="minor">
+            <a:schemeClr val="lt1"/>
+          </a:fontRef>
+        </p:style>
+        <p:txBody>
+          <a:bodyPr rtlCol="0" anchor="ctr"/>
+          <a:lstStyle/>
+          <a:p>
+            <a:pPr algn="ctr"/>
+            <a:r>
+              <a:rPr lang="es-MX" dirty="0">
+                <a:solidFill>
+                  <a:sysClr val="windowText" lastClr="000000"/>
+                </a:solidFill>
+              </a:rPr>
+              <a:t>Película ….. Ver más</a:t>
+            </a:r>
+          </a:p>
+        </p:txBody>
+      </p:sp>
+      <p:pic>
+        <p:nvPicPr>
+          <p:cNvPr id="16" name="Imagen 15" descr="Texto&#10;&#10;Descripción generada automáticamente con confianza media">
+            <a:extLst>
+              <a:ext uri="{FF2B5EF4-FFF2-40B4-BE49-F238E27FC236}">
+                <a16:creationId xmlns:a16="http://schemas.microsoft.com/office/drawing/2014/main" id="{F86E83F4-6252-8951-C96C-C3844ED44206}"/>
+              </a:ext>
+            </a:extLst>
+          </p:cNvPr>
+          <p:cNvPicPr>
+            <a:picLocks noChangeAspect="1"/>
+          </p:cNvPicPr>
+          <p:nvPr/>
+        </p:nvPicPr>
+        <p:blipFill>
+          <a:blip r:embed="rId2">
+            <a:extLst>
+              <a:ext uri="{28A0092B-C50C-407E-A947-70E740481C1C}">
+                <a14:useLocalDpi xmlns:a14="http://schemas.microsoft.com/office/drawing/2010/main" val="0"/>
+              </a:ext>
+            </a:extLst>
+          </a:blip>
+          <a:stretch>
+            <a:fillRect/>
+          </a:stretch>
+        </p:blipFill>
+        <p:spPr>
+          <a:xfrm>
+            <a:off x="9325693" y="1465364"/>
+            <a:ext cx="2086515" cy="1524015"/>
+          </a:xfrm>
+          <a:prstGeom prst="rect">
+            <a:avLst/>
+          </a:prstGeom>
+        </p:spPr>
+      </p:pic>
+    </p:spTree>
+    <p:extLst>
+      <p:ext uri="{BB962C8B-B14F-4D97-AF65-F5344CB8AC3E}">
+        <p14:creationId xmlns:p14="http://schemas.microsoft.com/office/powerpoint/2010/main" val="1423155742"/>
+      </p:ext>
+    </p:extLst>
+  </p:cSld>
+  <p:clrMapOvr>
+    <a:masterClrMapping/>
+  </p:clrMapOvr>
+</p:sld>
+</file>
+
+<file path=ppt/slides/slide9.xml><?xml version="1.0" encoding="utf-8"?>
+<p:sld xmlns:a="http://schemas.openxmlformats.org/drawingml/2006/main" xmlns:r="http://schemas.openxmlformats.org/officeDocument/2006/relationships" xmlns:p="http://schemas.openxmlformats.org/presentationml/2006/main">
+  <p:cSld>
+    <p:spTree>
+      <p:nvGrpSpPr>
+        <p:cNvPr id="1" name=""/>
+        <p:cNvGrpSpPr/>
+        <p:nvPr/>
+      </p:nvGrpSpPr>
+      <p:grpSpPr>
+        <a:xfrm>
+          <a:off x="0" y="0"/>
+          <a:ext cx="0" cy="0"/>
+          <a:chOff x="0" y="0"/>
+          <a:chExt cx="0" cy="0"/>
+        </a:xfrm>
+      </p:grpSpPr>
+      <p:sp>
+        <p:nvSpPr>
+          <p:cNvPr id="2" name="Título 1">
+            <a:extLst>
+              <a:ext uri="{FF2B5EF4-FFF2-40B4-BE49-F238E27FC236}">
+                <a16:creationId xmlns:a16="http://schemas.microsoft.com/office/drawing/2014/main" id="{DCFFF8EC-A30E-43D7-A38A-D77E5CD2B88E}"/>
+              </a:ext>
+            </a:extLst>
+          </p:cNvPr>
+          <p:cNvSpPr>
+            <a:spLocks noGrp="1"/>
+          </p:cNvSpPr>
+          <p:nvPr>
+            <p:ph type="title"/>
+          </p:nvPr>
+        </p:nvSpPr>
+        <p:spPr/>
+        <p:txBody>
+          <a:bodyPr/>
+          <a:lstStyle/>
+          <a:p>
+            <a:r>
+              <a:rPr lang="es-MX" dirty="0"/>
+              <a:t>Editar/crear </a:t>
+            </a:r>
+            <a:r>
+              <a:rPr lang="es-MX" dirty="0" err="1"/>
+              <a:t>pelicula</a:t>
+            </a:r>
+            <a:endParaRPr lang="es-MX" dirty="0"/>
+          </a:p>
+        </p:txBody>
+      </p:sp>
+      <p:sp>
+        <p:nvSpPr>
+          <p:cNvPr id="4" name="Rectángulo: esquinas redondeadas 3">
+            <a:extLst>
+              <a:ext uri="{FF2B5EF4-FFF2-40B4-BE49-F238E27FC236}">
+                <a16:creationId xmlns:a16="http://schemas.microsoft.com/office/drawing/2014/main" id="{B18ED188-B86E-7983-2C76-C61F7035B7AD}"/>
+              </a:ext>
+            </a:extLst>
+          </p:cNvPr>
+          <p:cNvSpPr/>
+          <p:nvPr/>
+        </p:nvSpPr>
+        <p:spPr>
+          <a:xfrm>
+            <a:off x="2829465" y="1889185"/>
+            <a:ext cx="5857336" cy="4603690"/>
+          </a:xfrm>
+          <a:prstGeom prst="roundRect">
+            <a:avLst/>
+          </a:prstGeom>
+        </p:spPr>
+        <p:style>
+          <a:lnRef idx="2">
+            <a:schemeClr val="accent1">
+              <a:shade val="50000"/>
+            </a:schemeClr>
+          </a:lnRef>
+          <a:fillRef idx="1">
+            <a:schemeClr val="accent1"/>
+          </a:fillRef>
+          <a:effectRef idx="0">
+            <a:schemeClr val="accent1"/>
+          </a:effectRef>
+          <a:fontRef idx="minor">
+            <a:schemeClr val="lt1"/>
+          </a:fontRef>
+        </p:style>
+        <p:txBody>
+          <a:bodyPr rtlCol="0" anchor="ctr"/>
+          <a:lstStyle/>
+          <a:p>
+            <a:pPr algn="ctr"/>
+            <a:endParaRPr lang="es-MX"/>
+          </a:p>
+        </p:txBody>
+      </p:sp>
+      <p:sp>
+        <p:nvSpPr>
+          <p:cNvPr id="5" name="Rectángulo: esquinas redondeadas 4">
+            <a:extLst>
+              <a:ext uri="{FF2B5EF4-FFF2-40B4-BE49-F238E27FC236}">
+                <a16:creationId xmlns:a16="http://schemas.microsoft.com/office/drawing/2014/main" id="{700F4254-AAEE-DBCD-B8DE-0820F735786C}"/>
+              </a:ext>
+            </a:extLst>
+          </p:cNvPr>
+          <p:cNvSpPr/>
+          <p:nvPr/>
+        </p:nvSpPr>
+        <p:spPr>
+          <a:xfrm>
+            <a:off x="3303917" y="2329132"/>
+            <a:ext cx="4968815" cy="474453"/>
+          </a:xfrm>
+          <a:prstGeom prst="roundRect">
+            <a:avLst/>
+          </a:prstGeom>
+          <a:solidFill>
+            <a:schemeClr val="bg1"/>
+          </a:solidFill>
+        </p:spPr>
+        <p:style>
+          <a:lnRef idx="2">
+            <a:schemeClr val="accent1">
+              <a:shade val="50000"/>
+            </a:schemeClr>
+          </a:lnRef>
+          <a:fillRef idx="1">
+            <a:schemeClr val="accent1"/>
+          </a:fillRef>
+          <a:effectRef idx="0">
+            <a:schemeClr val="accent1"/>
+          </a:effectRef>
+          <a:fontRef idx="minor">
+            <a:schemeClr val="lt1"/>
+          </a:fontRef>
+        </p:style>
+        <p:txBody>
+          <a:bodyPr rtlCol="0" anchor="ctr"/>
+          <a:lstStyle/>
+          <a:p>
+            <a:r>
+              <a:rPr lang="es-MX" dirty="0">
+                <a:solidFill>
+                  <a:sysClr val="windowText" lastClr="000000"/>
+                </a:solidFill>
+              </a:rPr>
+              <a:t>Titulo</a:t>
+            </a:r>
+          </a:p>
+        </p:txBody>
+      </p:sp>
+      <p:sp>
+        <p:nvSpPr>
+          <p:cNvPr id="6" name="Rectángulo: esquinas redondeadas 5">
+            <a:extLst>
+              <a:ext uri="{FF2B5EF4-FFF2-40B4-BE49-F238E27FC236}">
+                <a16:creationId xmlns:a16="http://schemas.microsoft.com/office/drawing/2014/main" id="{065A3BAA-128A-02B6-FDF5-496E8E7A318D}"/>
+              </a:ext>
+            </a:extLst>
+          </p:cNvPr>
+          <p:cNvSpPr/>
+          <p:nvPr/>
+        </p:nvSpPr>
+        <p:spPr>
+          <a:xfrm>
+            <a:off x="3273725" y="2958774"/>
+            <a:ext cx="4968815" cy="474453"/>
+          </a:xfrm>
+          <a:prstGeom prst="roundRect">
+            <a:avLst/>
+          </a:prstGeom>
+          <a:solidFill>
+            <a:schemeClr val="bg1"/>
+          </a:solidFill>
+        </p:spPr>
+        <p:style>
+          <a:lnRef idx="2">
+            <a:schemeClr val="accent1">
+              <a:shade val="50000"/>
+            </a:schemeClr>
+          </a:lnRef>
+          <a:fillRef idx="1">
+            <a:schemeClr val="accent1"/>
+          </a:fillRef>
+          <a:effectRef idx="0">
+            <a:schemeClr val="accent1"/>
+          </a:effectRef>
+          <a:fontRef idx="minor">
+            <a:schemeClr val="lt1"/>
+          </a:fontRef>
+        </p:style>
+        <p:txBody>
+          <a:bodyPr rtlCol="0" anchor="ctr"/>
+          <a:lstStyle/>
+          <a:p>
+            <a:r>
+              <a:rPr lang="es-MX" dirty="0">
+                <a:solidFill>
+                  <a:sysClr val="windowText" lastClr="000000"/>
+                </a:solidFill>
+              </a:rPr>
+              <a:t>Sinopsis/</a:t>
+            </a:r>
+            <a:r>
+              <a:rPr lang="es-MX" dirty="0" err="1">
+                <a:solidFill>
+                  <a:sysClr val="windowText" lastClr="000000"/>
+                </a:solidFill>
+              </a:rPr>
+              <a:t>descripcion</a:t>
+            </a:r>
+            <a:endParaRPr lang="es-MX" dirty="0">
+              <a:solidFill>
+                <a:sysClr val="windowText" lastClr="000000"/>
+              </a:solidFill>
+            </a:endParaRPr>
+          </a:p>
+        </p:txBody>
+      </p:sp>
+      <p:sp>
+        <p:nvSpPr>
+          <p:cNvPr id="7" name="Rectángulo: esquinas redondeadas 6">
+            <a:extLst>
+              <a:ext uri="{FF2B5EF4-FFF2-40B4-BE49-F238E27FC236}">
+                <a16:creationId xmlns:a16="http://schemas.microsoft.com/office/drawing/2014/main" id="{F9262D42-8546-E858-6F53-BEDD336F29F2}"/>
+              </a:ext>
+            </a:extLst>
+          </p:cNvPr>
+          <p:cNvSpPr/>
+          <p:nvPr/>
+        </p:nvSpPr>
+        <p:spPr>
+          <a:xfrm>
+            <a:off x="3273725" y="4097291"/>
+            <a:ext cx="4968815" cy="474453"/>
+          </a:xfrm>
+          <a:prstGeom prst="roundRect">
+            <a:avLst/>
+          </a:prstGeom>
+          <a:solidFill>
+            <a:schemeClr val="bg1"/>
+          </a:solidFill>
+        </p:spPr>
+        <p:style>
+          <a:lnRef idx="2">
+            <a:schemeClr val="accent1">
+              <a:shade val="50000"/>
+            </a:schemeClr>
+          </a:lnRef>
+          <a:fillRef idx="1">
+            <a:schemeClr val="accent1"/>
+          </a:fillRef>
+          <a:effectRef idx="0">
+            <a:schemeClr val="accent1"/>
+          </a:effectRef>
+          <a:fontRef idx="minor">
+            <a:schemeClr val="lt1"/>
+          </a:fontRef>
+        </p:style>
+        <p:txBody>
+          <a:bodyPr rtlCol="0" anchor="ctr"/>
+          <a:lstStyle/>
+          <a:p>
+            <a:r>
+              <a:rPr lang="es-MX" dirty="0" err="1">
+                <a:solidFill>
+                  <a:sysClr val="windowText" lastClr="000000"/>
+                </a:solidFill>
+              </a:rPr>
+              <a:t>Clasificacion</a:t>
+            </a:r>
+            <a:endParaRPr lang="es-MX" dirty="0">
+              <a:solidFill>
+                <a:sysClr val="windowText" lastClr="000000"/>
+              </a:solidFill>
+            </a:endParaRPr>
+          </a:p>
+        </p:txBody>
+      </p:sp>
+      <p:cxnSp>
+        <p:nvCxnSpPr>
+          <p:cNvPr id="9" name="Conector recto de flecha 8">
+            <a:extLst>
+              <a:ext uri="{FF2B5EF4-FFF2-40B4-BE49-F238E27FC236}">
+                <a16:creationId xmlns:a16="http://schemas.microsoft.com/office/drawing/2014/main" id="{F4B09D30-FB81-F457-367A-8457518F401E}"/>
+              </a:ext>
+            </a:extLst>
+          </p:cNvPr>
+          <p:cNvCxnSpPr/>
+          <p:nvPr/>
+        </p:nvCxnSpPr>
+        <p:spPr>
+          <a:xfrm>
+            <a:off x="8022566" y="4235313"/>
+            <a:ext cx="0" cy="280359"/>
+          </a:xfrm>
+          <a:prstGeom prst="straightConnector1">
+            <a:avLst/>
+          </a:prstGeom>
+          <a:ln>
+            <a:tailEnd type="triangle"/>
+          </a:ln>
+        </p:spPr>
+        <p:style>
+          <a:lnRef idx="1">
+            <a:schemeClr val="accent1"/>
+          </a:lnRef>
+          <a:fillRef idx="0">
+            <a:schemeClr val="accent1"/>
+          </a:fillRef>
+          <a:effectRef idx="0">
+            <a:schemeClr val="accent1"/>
+          </a:effectRef>
+          <a:fontRef idx="minor">
+            <a:schemeClr val="tx1"/>
+          </a:fontRef>
+        </p:style>
+      </p:cxnSp>
+      <p:sp>
+        <p:nvSpPr>
+          <p:cNvPr id="10" name="Rectángulo: esquinas redondeadas 9">
+            <a:extLst>
+              <a:ext uri="{FF2B5EF4-FFF2-40B4-BE49-F238E27FC236}">
+                <a16:creationId xmlns:a16="http://schemas.microsoft.com/office/drawing/2014/main" id="{5B7EB81C-FA2B-3D71-2EE5-8D7C4E7D95CA}"/>
+              </a:ext>
+            </a:extLst>
+          </p:cNvPr>
+          <p:cNvSpPr/>
+          <p:nvPr/>
+        </p:nvSpPr>
+        <p:spPr>
+          <a:xfrm>
+            <a:off x="3273725" y="4767905"/>
+            <a:ext cx="4968815" cy="474453"/>
+          </a:xfrm>
+          <a:prstGeom prst="roundRect">
+            <a:avLst/>
+          </a:prstGeom>
+          <a:solidFill>
+            <a:schemeClr val="bg1"/>
+          </a:solidFill>
+        </p:spPr>
+        <p:style>
+          <a:lnRef idx="2">
+            <a:schemeClr val="accent1">
+              <a:shade val="50000"/>
+            </a:schemeClr>
+          </a:lnRef>
+          <a:fillRef idx="1">
+            <a:schemeClr val="accent1"/>
+          </a:fillRef>
+          <a:effectRef idx="0">
+            <a:schemeClr val="accent1"/>
+          </a:effectRef>
+          <a:fontRef idx="minor">
+            <a:schemeClr val="lt1"/>
+          </a:fontRef>
+        </p:style>
+        <p:txBody>
+          <a:bodyPr rtlCol="0" anchor="ctr"/>
+          <a:lstStyle/>
+          <a:p>
+            <a:r>
+              <a:rPr lang="es-MX" dirty="0" err="1">
+                <a:solidFill>
+                  <a:sysClr val="windowText" lastClr="000000"/>
+                </a:solidFill>
+              </a:rPr>
+              <a:t>Clasificacion</a:t>
+            </a:r>
+            <a:endParaRPr lang="es-MX" dirty="0">
+              <a:solidFill>
+                <a:sysClr val="windowText" lastClr="000000"/>
+              </a:solidFill>
+            </a:endParaRPr>
+          </a:p>
+        </p:txBody>
+      </p:sp>
+      <p:cxnSp>
+        <p:nvCxnSpPr>
+          <p:cNvPr id="11" name="Conector recto de flecha 10">
+            <a:extLst>
+              <a:ext uri="{FF2B5EF4-FFF2-40B4-BE49-F238E27FC236}">
+                <a16:creationId xmlns:a16="http://schemas.microsoft.com/office/drawing/2014/main" id="{D7BCE8C5-C9A5-3514-6002-AEC4C2362039}"/>
+              </a:ext>
+            </a:extLst>
+          </p:cNvPr>
+          <p:cNvCxnSpPr/>
+          <p:nvPr/>
+        </p:nvCxnSpPr>
+        <p:spPr>
+          <a:xfrm>
+            <a:off x="8022566" y="4905927"/>
+            <a:ext cx="0" cy="280359"/>
+          </a:xfrm>
+          <a:prstGeom prst="straightConnector1">
+            <a:avLst/>
+          </a:prstGeom>
+          <a:ln>
+            <a:tailEnd type="triangle"/>
+          </a:ln>
+        </p:spPr>
+        <p:style>
+          <a:lnRef idx="1">
+            <a:schemeClr val="accent1"/>
+          </a:lnRef>
+          <a:fillRef idx="0">
+            <a:schemeClr val="accent1"/>
+          </a:fillRef>
+          <a:effectRef idx="0">
+            <a:schemeClr val="accent1"/>
+          </a:effectRef>
+          <a:fontRef idx="minor">
+            <a:schemeClr val="tx1"/>
+          </a:fontRef>
+        </p:style>
+      </p:cxnSp>
+      <p:sp>
+        <p:nvSpPr>
+          <p:cNvPr id="12" name="Rectángulo: esquinas redondeadas 11">
+            <a:extLst>
+              <a:ext uri="{FF2B5EF4-FFF2-40B4-BE49-F238E27FC236}">
+                <a16:creationId xmlns:a16="http://schemas.microsoft.com/office/drawing/2014/main" id="{6242DF94-1CBD-71EC-EB74-3CAE2A179A50}"/>
+              </a:ext>
+            </a:extLst>
+          </p:cNvPr>
+          <p:cNvSpPr/>
+          <p:nvPr/>
+        </p:nvSpPr>
+        <p:spPr>
+          <a:xfrm>
+            <a:off x="3273724" y="5421267"/>
+            <a:ext cx="2229929" cy="474453"/>
+          </a:xfrm>
+          <a:prstGeom prst="roundRect">
+            <a:avLst/>
+          </a:prstGeom>
+          <a:solidFill>
+            <a:schemeClr val="bg1"/>
+          </a:solidFill>
+        </p:spPr>
+        <p:style>
+          <a:lnRef idx="2">
+            <a:schemeClr val="accent1">
+              <a:shade val="50000"/>
+            </a:schemeClr>
+          </a:lnRef>
+          <a:fillRef idx="1">
+            <a:schemeClr val="accent1"/>
+          </a:fillRef>
+          <a:effectRef idx="0">
+            <a:schemeClr val="accent1"/>
+          </a:effectRef>
+          <a:fontRef idx="minor">
+            <a:schemeClr val="lt1"/>
+          </a:fontRef>
+        </p:style>
+        <p:txBody>
+          <a:bodyPr rtlCol="0" anchor="ctr"/>
+          <a:lstStyle/>
+          <a:p>
+            <a:r>
+              <a:rPr lang="es-MX" dirty="0">
+                <a:solidFill>
+                  <a:sysClr val="windowText" lastClr="000000"/>
+                </a:solidFill>
+              </a:rPr>
+              <a:t>Estreno</a:t>
+            </a:r>
+          </a:p>
+        </p:txBody>
+      </p:sp>
+      <p:sp>
+        <p:nvSpPr>
+          <p:cNvPr id="13" name="Rectángulo: esquinas redondeadas 12">
+            <a:extLst>
+              <a:ext uri="{FF2B5EF4-FFF2-40B4-BE49-F238E27FC236}">
+                <a16:creationId xmlns:a16="http://schemas.microsoft.com/office/drawing/2014/main" id="{B2CA89F9-8134-CB83-F619-A2C59102FFC4}"/>
+              </a:ext>
+            </a:extLst>
+          </p:cNvPr>
+          <p:cNvSpPr/>
+          <p:nvPr/>
+        </p:nvSpPr>
+        <p:spPr>
+          <a:xfrm>
+            <a:off x="6042803" y="5420910"/>
+            <a:ext cx="2229929" cy="474453"/>
+          </a:xfrm>
+          <a:prstGeom prst="roundRect">
+            <a:avLst/>
+          </a:prstGeom>
+          <a:solidFill>
+            <a:schemeClr val="bg1"/>
+          </a:solidFill>
+        </p:spPr>
+        <p:style>
+          <a:lnRef idx="2">
+            <a:schemeClr val="accent1">
+              <a:shade val="50000"/>
+            </a:schemeClr>
+          </a:lnRef>
+          <a:fillRef idx="1">
+            <a:schemeClr val="accent1"/>
+          </a:fillRef>
+          <a:effectRef idx="0">
+            <a:schemeClr val="accent1"/>
+          </a:effectRef>
+          <a:fontRef idx="minor">
+            <a:schemeClr val="lt1"/>
+          </a:fontRef>
+        </p:style>
+        <p:txBody>
+          <a:bodyPr rtlCol="0" anchor="ctr"/>
+          <a:lstStyle/>
+          <a:p>
+            <a:r>
+              <a:rPr lang="es-MX" dirty="0">
+                <a:solidFill>
+                  <a:sysClr val="windowText" lastClr="000000"/>
+                </a:solidFill>
+              </a:rPr>
+              <a:t>Fuera de cartela</a:t>
+            </a:r>
+          </a:p>
+        </p:txBody>
+      </p:sp>
+      <p:sp>
+        <p:nvSpPr>
+          <p:cNvPr id="14" name="Rectángulo: esquinas redondeadas 13">
+            <a:extLst>
+              <a:ext uri="{FF2B5EF4-FFF2-40B4-BE49-F238E27FC236}">
+                <a16:creationId xmlns:a16="http://schemas.microsoft.com/office/drawing/2014/main" id="{91126E99-876F-689B-5EBE-C8E7321BBEBE}"/>
+              </a:ext>
+            </a:extLst>
+          </p:cNvPr>
+          <p:cNvSpPr/>
+          <p:nvPr/>
+        </p:nvSpPr>
+        <p:spPr>
+          <a:xfrm>
+            <a:off x="3273724" y="3531291"/>
+            <a:ext cx="4968815" cy="474453"/>
+          </a:xfrm>
+          <a:prstGeom prst="roundRect">
+            <a:avLst/>
+          </a:prstGeom>
+          <a:solidFill>
+            <a:schemeClr val="bg1"/>
+          </a:solidFill>
+        </p:spPr>
+        <p:style>
+          <a:lnRef idx="2">
+            <a:schemeClr val="accent1">
+              <a:shade val="50000"/>
+            </a:schemeClr>
+          </a:lnRef>
+          <a:fillRef idx="1">
+            <a:schemeClr val="accent1"/>
+          </a:fillRef>
+          <a:effectRef idx="0">
+            <a:schemeClr val="accent1"/>
+          </a:effectRef>
+          <a:fontRef idx="minor">
+            <a:schemeClr val="lt1"/>
+          </a:fontRef>
+        </p:style>
+        <p:txBody>
+          <a:bodyPr rtlCol="0" anchor="ctr"/>
+          <a:lstStyle/>
+          <a:p>
+            <a:r>
+              <a:rPr lang="es-MX" dirty="0">
+                <a:solidFill>
+                  <a:sysClr val="windowText" lastClr="000000"/>
+                </a:solidFill>
+              </a:rPr>
+              <a:t>Poster</a:t>
+            </a:r>
+          </a:p>
+        </p:txBody>
+      </p:sp>
+      <p:sp>
+        <p:nvSpPr>
+          <p:cNvPr id="15" name="Rectángulo: esquinas redondeadas 14">
+            <a:extLst>
+              <a:ext uri="{FF2B5EF4-FFF2-40B4-BE49-F238E27FC236}">
+                <a16:creationId xmlns:a16="http://schemas.microsoft.com/office/drawing/2014/main" id="{EF386904-375F-7D02-2B9E-E31485C64E04}"/>
+              </a:ext>
+            </a:extLst>
+          </p:cNvPr>
+          <p:cNvSpPr/>
+          <p:nvPr/>
+        </p:nvSpPr>
+        <p:spPr>
+          <a:xfrm>
+            <a:off x="4388688" y="5947120"/>
+            <a:ext cx="1177507" cy="474453"/>
+          </a:xfrm>
+          <a:prstGeom prst="roundRect">
+            <a:avLst/>
+          </a:prstGeom>
+          <a:solidFill>
+            <a:schemeClr val="bg1"/>
+          </a:solidFill>
+        </p:spPr>
+        <p:style>
+          <a:lnRef idx="2">
+            <a:schemeClr val="accent1">
+              <a:shade val="50000"/>
+            </a:schemeClr>
+          </a:lnRef>
+          <a:fillRef idx="1">
+            <a:schemeClr val="accent1"/>
+          </a:fillRef>
+          <a:effectRef idx="0">
+            <a:schemeClr val="accent1"/>
+          </a:effectRef>
+          <a:fontRef idx="minor">
+            <a:schemeClr val="lt1"/>
+          </a:fontRef>
+        </p:style>
+        <p:txBody>
+          <a:bodyPr rtlCol="0" anchor="ctr"/>
+          <a:lstStyle/>
+          <a:p>
+            <a:r>
+              <a:rPr lang="es-MX" dirty="0">
+                <a:solidFill>
+                  <a:sysClr val="windowText" lastClr="000000"/>
+                </a:solidFill>
+              </a:rPr>
+              <a:t>Cancelar</a:t>
+            </a:r>
+          </a:p>
+        </p:txBody>
+      </p:sp>
+      <p:sp>
+        <p:nvSpPr>
+          <p:cNvPr id="16" name="Rectángulo: esquinas redondeadas 15">
+            <a:extLst>
+              <a:ext uri="{FF2B5EF4-FFF2-40B4-BE49-F238E27FC236}">
+                <a16:creationId xmlns:a16="http://schemas.microsoft.com/office/drawing/2014/main" id="{E5B17E25-4467-D213-77A0-5A6DF5C7F723}"/>
+              </a:ext>
+            </a:extLst>
+          </p:cNvPr>
+          <p:cNvSpPr/>
+          <p:nvPr/>
+        </p:nvSpPr>
+        <p:spPr>
+          <a:xfrm>
+            <a:off x="5777541" y="5947120"/>
+            <a:ext cx="1177507" cy="474453"/>
+          </a:xfrm>
+          <a:prstGeom prst="roundRect">
+            <a:avLst/>
+          </a:prstGeom>
+          <a:solidFill>
+            <a:schemeClr val="bg1"/>
+          </a:solidFill>
+        </p:spPr>
+        <p:style>
+          <a:lnRef idx="2">
+            <a:schemeClr val="accent1">
+              <a:shade val="50000"/>
+            </a:schemeClr>
+          </a:lnRef>
+          <a:fillRef idx="1">
+            <a:schemeClr val="accent1"/>
+          </a:fillRef>
+          <a:effectRef idx="0">
+            <a:schemeClr val="accent1"/>
+          </a:effectRef>
+          <a:fontRef idx="minor">
+            <a:schemeClr val="lt1"/>
+          </a:fontRef>
+        </p:style>
+        <p:txBody>
+          <a:bodyPr rtlCol="0" anchor="ctr"/>
+          <a:lstStyle/>
+          <a:p>
+            <a:r>
+              <a:rPr lang="es-MX" dirty="0">
+                <a:solidFill>
+                  <a:sysClr val="windowText" lastClr="000000"/>
+                </a:solidFill>
+              </a:rPr>
+              <a:t>Guardar</a:t>
+            </a:r>
+          </a:p>
+        </p:txBody>
+      </p:sp>
+    </p:spTree>
+    <p:extLst>
+      <p:ext uri="{BB962C8B-B14F-4D97-AF65-F5344CB8AC3E}">
+        <p14:creationId xmlns:p14="http://schemas.microsoft.com/office/powerpoint/2010/main" val="3440717786"/>
       </p:ext>
     </p:extLst>
   </p:cSld>

</xml_diff>

<commit_message>
cuarto commit del curso de capacitacion de formación dual uptx
</commit_message>
<xml_diff>
--- a/actividades/Desarrollo Web.pptx
+++ b/actividades/Desarrollo Web.pptx
@@ -14,6 +14,9 @@
     <p:sldId id="262" r:id="rId8"/>
     <p:sldId id="263" r:id="rId9"/>
     <p:sldId id="264" r:id="rId10"/>
+    <p:sldId id="265" r:id="rId11"/>
+    <p:sldId id="266" r:id="rId12"/>
+    <p:sldId id="267" r:id="rId13"/>
   </p:sldIdLst>
   <p:sldSz cx="12192000" cy="6858000"/>
   <p:notesSz cx="6858000" cy="9144000"/>
@@ -269,7 +272,7 @@
           <a:p>
             <a:fld id="{93B37B95-31F0-458D-A6E3-84E44F6CE409}" type="datetimeFigureOut">
               <a:rPr lang="es-MX" smtClean="0"/>
-              <a:t>22/06/2022</a:t>
+              <a:t>23/06/2022</a:t>
             </a:fld>
             <a:endParaRPr lang="es-MX"/>
           </a:p>
@@ -469,7 +472,7 @@
           <a:p>
             <a:fld id="{93B37B95-31F0-458D-A6E3-84E44F6CE409}" type="datetimeFigureOut">
               <a:rPr lang="es-MX" smtClean="0"/>
-              <a:t>22/06/2022</a:t>
+              <a:t>23/06/2022</a:t>
             </a:fld>
             <a:endParaRPr lang="es-MX"/>
           </a:p>
@@ -679,7 +682,7 @@
           <a:p>
             <a:fld id="{93B37B95-31F0-458D-A6E3-84E44F6CE409}" type="datetimeFigureOut">
               <a:rPr lang="es-MX" smtClean="0"/>
-              <a:t>22/06/2022</a:t>
+              <a:t>23/06/2022</a:t>
             </a:fld>
             <a:endParaRPr lang="es-MX"/>
           </a:p>
@@ -879,7 +882,7 @@
           <a:p>
             <a:fld id="{93B37B95-31F0-458D-A6E3-84E44F6CE409}" type="datetimeFigureOut">
               <a:rPr lang="es-MX" smtClean="0"/>
-              <a:t>22/06/2022</a:t>
+              <a:t>23/06/2022</a:t>
             </a:fld>
             <a:endParaRPr lang="es-MX"/>
           </a:p>
@@ -1155,7 +1158,7 @@
           <a:p>
             <a:fld id="{93B37B95-31F0-458D-A6E3-84E44F6CE409}" type="datetimeFigureOut">
               <a:rPr lang="es-MX" smtClean="0"/>
-              <a:t>22/06/2022</a:t>
+              <a:t>23/06/2022</a:t>
             </a:fld>
             <a:endParaRPr lang="es-MX"/>
           </a:p>
@@ -1423,7 +1426,7 @@
           <a:p>
             <a:fld id="{93B37B95-31F0-458D-A6E3-84E44F6CE409}" type="datetimeFigureOut">
               <a:rPr lang="es-MX" smtClean="0"/>
-              <a:t>22/06/2022</a:t>
+              <a:t>23/06/2022</a:t>
             </a:fld>
             <a:endParaRPr lang="es-MX"/>
           </a:p>
@@ -1838,7 +1841,7 @@
           <a:p>
             <a:fld id="{93B37B95-31F0-458D-A6E3-84E44F6CE409}" type="datetimeFigureOut">
               <a:rPr lang="es-MX" smtClean="0"/>
-              <a:t>22/06/2022</a:t>
+              <a:t>23/06/2022</a:t>
             </a:fld>
             <a:endParaRPr lang="es-MX"/>
           </a:p>
@@ -1980,7 +1983,7 @@
           <a:p>
             <a:fld id="{93B37B95-31F0-458D-A6E3-84E44F6CE409}" type="datetimeFigureOut">
               <a:rPr lang="es-MX" smtClean="0"/>
-              <a:t>22/06/2022</a:t>
+              <a:t>23/06/2022</a:t>
             </a:fld>
             <a:endParaRPr lang="es-MX"/>
           </a:p>
@@ -2093,7 +2096,7 @@
           <a:p>
             <a:fld id="{93B37B95-31F0-458D-A6E3-84E44F6CE409}" type="datetimeFigureOut">
               <a:rPr lang="es-MX" smtClean="0"/>
-              <a:t>22/06/2022</a:t>
+              <a:t>23/06/2022</a:t>
             </a:fld>
             <a:endParaRPr lang="es-MX"/>
           </a:p>
@@ -2406,7 +2409,7 @@
           <a:p>
             <a:fld id="{93B37B95-31F0-458D-A6E3-84E44F6CE409}" type="datetimeFigureOut">
               <a:rPr lang="es-MX" smtClean="0"/>
-              <a:t>22/06/2022</a:t>
+              <a:t>23/06/2022</a:t>
             </a:fld>
             <a:endParaRPr lang="es-MX"/>
           </a:p>
@@ -2695,7 +2698,7 @@
           <a:p>
             <a:fld id="{93B37B95-31F0-458D-A6E3-84E44F6CE409}" type="datetimeFigureOut">
               <a:rPr lang="es-MX" smtClean="0"/>
-              <a:t>22/06/2022</a:t>
+              <a:t>23/06/2022</a:t>
             </a:fld>
             <a:endParaRPr lang="es-MX"/>
           </a:p>
@@ -2938,7 +2941,7 @@
           <a:p>
             <a:fld id="{93B37B95-31F0-458D-A6E3-84E44F6CE409}" type="datetimeFigureOut">
               <a:rPr lang="es-MX" smtClean="0"/>
-              <a:t>22/06/2022</a:t>
+              <a:t>23/06/2022</a:t>
             </a:fld>
             <a:endParaRPr lang="es-MX"/>
           </a:p>
@@ -3444,6 +3447,473 @@
 </p:sld>
 </file>
 
+<file path=ppt/slides/slide10.xml><?xml version="1.0" encoding="utf-8"?>
+<p:sld xmlns:a="http://schemas.openxmlformats.org/drawingml/2006/main" xmlns:r="http://schemas.openxmlformats.org/officeDocument/2006/relationships" xmlns:p="http://schemas.openxmlformats.org/presentationml/2006/main">
+  <p:cSld>
+    <p:spTree>
+      <p:nvGrpSpPr>
+        <p:cNvPr id="1" name=""/>
+        <p:cNvGrpSpPr/>
+        <p:nvPr/>
+      </p:nvGrpSpPr>
+      <p:grpSpPr>
+        <a:xfrm>
+          <a:off x="0" y="0"/>
+          <a:ext cx="0" cy="0"/>
+          <a:chOff x="0" y="0"/>
+          <a:chExt cx="0" cy="0"/>
+        </a:xfrm>
+      </p:grpSpPr>
+      <p:sp>
+        <p:nvSpPr>
+          <p:cNvPr id="2" name="Título 1">
+            <a:extLst>
+              <a:ext uri="{FF2B5EF4-FFF2-40B4-BE49-F238E27FC236}">
+                <a16:creationId xmlns:a16="http://schemas.microsoft.com/office/drawing/2014/main" id="{4B4EF331-7EE8-6A88-B0AB-0FFD929FDBA6}"/>
+              </a:ext>
+            </a:extLst>
+          </p:cNvPr>
+          <p:cNvSpPr>
+            <a:spLocks noGrp="1"/>
+          </p:cNvSpPr>
+          <p:nvPr>
+            <p:ph type="title"/>
+          </p:nvPr>
+        </p:nvSpPr>
+        <p:spPr/>
+        <p:txBody>
+          <a:bodyPr/>
+          <a:lstStyle/>
+          <a:p>
+            <a:endParaRPr lang="es-MX"/>
+          </a:p>
+        </p:txBody>
+      </p:sp>
+      <p:sp>
+        <p:nvSpPr>
+          <p:cNvPr id="3" name="Marcador de contenido 2">
+            <a:extLst>
+              <a:ext uri="{FF2B5EF4-FFF2-40B4-BE49-F238E27FC236}">
+                <a16:creationId xmlns:a16="http://schemas.microsoft.com/office/drawing/2014/main" id="{C260D34B-57D1-FBDF-127C-32D60B8A098E}"/>
+              </a:ext>
+            </a:extLst>
+          </p:cNvPr>
+          <p:cNvSpPr>
+            <a:spLocks noGrp="1"/>
+          </p:cNvSpPr>
+          <p:nvPr>
+            <p:ph idx="1"/>
+          </p:nvPr>
+        </p:nvSpPr>
+        <p:spPr/>
+        <p:txBody>
+          <a:bodyPr/>
+          <a:lstStyle/>
+          <a:p>
+            <a:r>
+              <a:rPr lang="es-MX" dirty="0"/>
+              <a:t>Completar los campos del formulario</a:t>
+            </a:r>
+          </a:p>
+          <a:p>
+            <a:r>
+              <a:rPr lang="es-MX" dirty="0"/>
+              <a:t>Investigar el </a:t>
+            </a:r>
+            <a:r>
+              <a:rPr lang="es-MX" dirty="0" err="1"/>
+              <a:t>delay</a:t>
+            </a:r>
+            <a:r>
+              <a:rPr lang="es-MX" dirty="0"/>
+              <a:t> tiempo de la animación de </a:t>
+            </a:r>
+            <a:r>
+              <a:rPr lang="es-MX" dirty="0" err="1"/>
+              <a:t>jquery</a:t>
+            </a:r>
+            <a:r>
+              <a:rPr lang="es-MX" dirty="0"/>
+              <a:t> (</a:t>
+            </a:r>
+            <a:r>
+              <a:rPr lang="es-MX" dirty="0" err="1"/>
+              <a:t>fadein</a:t>
+            </a:r>
+            <a:r>
+              <a:rPr lang="es-MX" dirty="0"/>
+              <a:t>/</a:t>
+            </a:r>
+            <a:r>
+              <a:rPr lang="es-MX" dirty="0" err="1"/>
+              <a:t>fadeout</a:t>
+            </a:r>
+            <a:r>
+              <a:rPr lang="es-MX" dirty="0"/>
+              <a:t>)</a:t>
+            </a:r>
+          </a:p>
+          <a:p>
+            <a:r>
+              <a:rPr lang="es-MX" dirty="0"/>
+              <a:t>Investigar y aplicar una conexión de </a:t>
+            </a:r>
+            <a:r>
+              <a:rPr lang="es-MX" dirty="0" err="1"/>
+              <a:t>bd</a:t>
+            </a:r>
+            <a:r>
+              <a:rPr lang="es-MX" dirty="0"/>
+              <a:t> desde </a:t>
+            </a:r>
+            <a:r>
+              <a:rPr lang="es-MX" dirty="0" err="1"/>
+              <a:t>php</a:t>
+            </a:r>
+            <a:r>
+              <a:rPr lang="es-MX" dirty="0"/>
+              <a:t> con </a:t>
+            </a:r>
+            <a:r>
+              <a:rPr lang="es-MX" dirty="0" err="1"/>
+              <a:t>mysqli</a:t>
+            </a:r>
+            <a:r>
+              <a:rPr lang="es-MX" dirty="0"/>
+              <a:t> y realizar una consulta a la BD de películas y el catalogo de </a:t>
+            </a:r>
+            <a:r>
+              <a:rPr lang="es-MX" dirty="0" err="1"/>
+              <a:t>categoria</a:t>
+            </a:r>
+            <a:endParaRPr lang="es-MX" dirty="0"/>
+          </a:p>
+          <a:p>
+            <a:endParaRPr lang="es-MX" dirty="0"/>
+          </a:p>
+        </p:txBody>
+      </p:sp>
+    </p:spTree>
+    <p:extLst>
+      <p:ext uri="{BB962C8B-B14F-4D97-AF65-F5344CB8AC3E}">
+        <p14:creationId xmlns:p14="http://schemas.microsoft.com/office/powerpoint/2010/main" val="164833984"/>
+      </p:ext>
+    </p:extLst>
+  </p:cSld>
+  <p:clrMapOvr>
+    <a:masterClrMapping/>
+  </p:clrMapOvr>
+</p:sld>
+</file>
+
+<file path=ppt/slides/slide11.xml><?xml version="1.0" encoding="utf-8"?>
+<p:sld xmlns:a="http://schemas.openxmlformats.org/drawingml/2006/main" xmlns:r="http://schemas.openxmlformats.org/officeDocument/2006/relationships" xmlns:p="http://schemas.openxmlformats.org/presentationml/2006/main">
+  <p:cSld>
+    <p:spTree>
+      <p:nvGrpSpPr>
+        <p:cNvPr id="1" name=""/>
+        <p:cNvGrpSpPr/>
+        <p:nvPr/>
+      </p:nvGrpSpPr>
+      <p:grpSpPr>
+        <a:xfrm>
+          <a:off x="0" y="0"/>
+          <a:ext cx="0" cy="0"/>
+          <a:chOff x="0" y="0"/>
+          <a:chExt cx="0" cy="0"/>
+        </a:xfrm>
+      </p:grpSpPr>
+      <p:sp>
+        <p:nvSpPr>
+          <p:cNvPr id="2" name="Título 1">
+            <a:extLst>
+              <a:ext uri="{FF2B5EF4-FFF2-40B4-BE49-F238E27FC236}">
+                <a16:creationId xmlns:a16="http://schemas.microsoft.com/office/drawing/2014/main" id="{DA10E4D3-E268-A2F8-76CB-EB9FCF2EE4F5}"/>
+              </a:ext>
+            </a:extLst>
+          </p:cNvPr>
+          <p:cNvSpPr>
+            <a:spLocks noGrp="1"/>
+          </p:cNvSpPr>
+          <p:nvPr>
+            <p:ph type="title"/>
+          </p:nvPr>
+        </p:nvSpPr>
+        <p:spPr/>
+        <p:txBody>
+          <a:bodyPr/>
+          <a:lstStyle/>
+          <a:p>
+            <a:r>
+              <a:rPr lang="es-MX" dirty="0"/>
+              <a:t>Backend</a:t>
+            </a:r>
+          </a:p>
+        </p:txBody>
+      </p:sp>
+      <p:sp>
+        <p:nvSpPr>
+          <p:cNvPr id="3" name="Marcador de contenido 2">
+            <a:extLst>
+              <a:ext uri="{FF2B5EF4-FFF2-40B4-BE49-F238E27FC236}">
+                <a16:creationId xmlns:a16="http://schemas.microsoft.com/office/drawing/2014/main" id="{D4AF6C0A-7A3F-0EF2-D338-1A4AF0FF9420}"/>
+              </a:ext>
+            </a:extLst>
+          </p:cNvPr>
+          <p:cNvSpPr>
+            <a:spLocks noGrp="1"/>
+          </p:cNvSpPr>
+          <p:nvPr>
+            <p:ph idx="1"/>
+          </p:nvPr>
+        </p:nvSpPr>
+        <p:spPr/>
+        <p:txBody>
+          <a:bodyPr/>
+          <a:lstStyle/>
+          <a:p>
+            <a:r>
+              <a:rPr lang="es-MX" dirty="0"/>
+              <a:t>Arquitectura MVC Modelo-Vista-Controlador</a:t>
+            </a:r>
+          </a:p>
+          <a:p>
+            <a:r>
+              <a:rPr lang="es-MX" dirty="0"/>
+              <a:t>Modelo: lógica de negocio y persistencia de datos (la ultima capa)</a:t>
+            </a:r>
+          </a:p>
+          <a:p>
+            <a:r>
+              <a:rPr lang="es-MX" dirty="0"/>
+              <a:t>Controlador: </a:t>
+            </a:r>
+            <a:r>
+              <a:rPr lang="es-MX" dirty="0" err="1"/>
+              <a:t>Delegador</a:t>
+            </a:r>
+            <a:r>
+              <a:rPr lang="es-MX" dirty="0"/>
+              <a:t> de las operaciones decide hacia que modelo, captcha, validaciones campos</a:t>
+            </a:r>
+          </a:p>
+          <a:p>
+            <a:r>
+              <a:rPr lang="es-MX" dirty="0"/>
+              <a:t>Vista: documento final o la respuesta que va a tener servidor Backend</a:t>
+            </a:r>
+          </a:p>
+          <a:p>
+            <a:r>
+              <a:rPr lang="es-MX" dirty="0"/>
+              <a:t>Respuestas: HTML, </a:t>
+            </a:r>
+            <a:r>
+              <a:rPr lang="es-MX" dirty="0" err="1"/>
+              <a:t>xml</a:t>
+            </a:r>
+            <a:r>
+              <a:rPr lang="es-MX" dirty="0"/>
+              <a:t>, JSON</a:t>
+            </a:r>
+          </a:p>
+          <a:p>
+            <a:r>
+              <a:rPr lang="es-MX" dirty="0"/>
+              <a:t>Al construir un api </a:t>
+            </a:r>
+            <a:r>
+              <a:rPr lang="es-MX" dirty="0" err="1"/>
+              <a:t>rest</a:t>
+            </a:r>
+            <a:r>
+              <a:rPr lang="es-MX" dirty="0"/>
+              <a:t> – JSON: en este ejemplo api </a:t>
+            </a:r>
+            <a:r>
+              <a:rPr lang="es-MX" dirty="0" err="1"/>
+              <a:t>rest</a:t>
+            </a:r>
+            <a:r>
+              <a:rPr lang="es-MX" dirty="0"/>
+              <a:t> de películas</a:t>
+            </a:r>
+          </a:p>
+          <a:p>
+            <a:pPr lvl="1"/>
+            <a:r>
+              <a:rPr lang="es-MX" dirty="0"/>
+              <a:t>CRUD: </a:t>
+            </a:r>
+            <a:r>
+              <a:rPr lang="es-MX" dirty="0" err="1"/>
+              <a:t>Create</a:t>
+            </a:r>
+            <a:r>
+              <a:rPr lang="es-MX" dirty="0"/>
+              <a:t>, </a:t>
+            </a:r>
+            <a:r>
+              <a:rPr lang="es-MX" dirty="0" err="1"/>
+              <a:t>Read</a:t>
+            </a:r>
+            <a:r>
+              <a:rPr lang="es-MX" dirty="0"/>
+              <a:t>, </a:t>
+            </a:r>
+            <a:r>
+              <a:rPr lang="es-MX" dirty="0" err="1"/>
+              <a:t>Update</a:t>
+            </a:r>
+            <a:r>
+              <a:rPr lang="es-MX" dirty="0"/>
+              <a:t>, </a:t>
+            </a:r>
+            <a:r>
+              <a:rPr lang="es-MX" dirty="0" err="1"/>
+              <a:t>Delete</a:t>
+            </a:r>
+            <a:endParaRPr lang="es-MX" dirty="0"/>
+          </a:p>
+        </p:txBody>
+      </p:sp>
+    </p:spTree>
+    <p:extLst>
+      <p:ext uri="{BB962C8B-B14F-4D97-AF65-F5344CB8AC3E}">
+        <p14:creationId xmlns:p14="http://schemas.microsoft.com/office/powerpoint/2010/main" val="2045258550"/>
+      </p:ext>
+    </p:extLst>
+  </p:cSld>
+  <p:clrMapOvr>
+    <a:masterClrMapping/>
+  </p:clrMapOvr>
+</p:sld>
+</file>
+
+<file path=ppt/slides/slide12.xml><?xml version="1.0" encoding="utf-8"?>
+<p:sld xmlns:a="http://schemas.openxmlformats.org/drawingml/2006/main" xmlns:r="http://schemas.openxmlformats.org/officeDocument/2006/relationships" xmlns:p="http://schemas.openxmlformats.org/presentationml/2006/main">
+  <p:cSld>
+    <p:spTree>
+      <p:nvGrpSpPr>
+        <p:cNvPr id="1" name=""/>
+        <p:cNvGrpSpPr/>
+        <p:nvPr/>
+      </p:nvGrpSpPr>
+      <p:grpSpPr>
+        <a:xfrm>
+          <a:off x="0" y="0"/>
+          <a:ext cx="0" cy="0"/>
+          <a:chOff x="0" y="0"/>
+          <a:chExt cx="0" cy="0"/>
+        </a:xfrm>
+      </p:grpSpPr>
+      <p:sp>
+        <p:nvSpPr>
+          <p:cNvPr id="3" name="Marcador de contenido 2">
+            <a:extLst>
+              <a:ext uri="{FF2B5EF4-FFF2-40B4-BE49-F238E27FC236}">
+                <a16:creationId xmlns:a16="http://schemas.microsoft.com/office/drawing/2014/main" id="{F8FF4A91-4973-9530-C398-36A5A48F7538}"/>
+              </a:ext>
+            </a:extLst>
+          </p:cNvPr>
+          <p:cNvSpPr>
+            <a:spLocks noGrp="1"/>
+          </p:cNvSpPr>
+          <p:nvPr>
+            <p:ph idx="1"/>
+          </p:nvPr>
+        </p:nvSpPr>
+        <p:spPr>
+          <a:xfrm>
+            <a:off x="838200" y="552893"/>
+            <a:ext cx="10515600" cy="5624070"/>
+          </a:xfrm>
+        </p:spPr>
+        <p:txBody>
+          <a:bodyPr/>
+          <a:lstStyle/>
+          <a:p>
+            <a:r>
+              <a:rPr lang="es-MX" dirty="0"/>
+              <a:t>Rutas: Agregar película, tablero películas, modificar películas, eliminar películas, </a:t>
+            </a:r>
+            <a:r>
+              <a:rPr lang="es-MX" dirty="0" err="1"/>
+              <a:t>obtener_catálogos</a:t>
+            </a:r>
+            <a:endParaRPr lang="es-MX" dirty="0"/>
+          </a:p>
+          <a:p>
+            <a:r>
+              <a:rPr lang="es-MX" dirty="0"/>
+              <a:t>Controladores: </a:t>
+            </a:r>
+            <a:r>
+              <a:rPr lang="es-MX" dirty="0" err="1"/>
+              <a:t>controler</a:t>
+            </a:r>
+            <a:r>
+              <a:rPr lang="es-MX" dirty="0"/>
+              <a:t> películas, </a:t>
+            </a:r>
+            <a:r>
+              <a:rPr lang="es-MX" dirty="0" err="1"/>
+              <a:t>controler</a:t>
+            </a:r>
+            <a:r>
+              <a:rPr lang="es-MX" dirty="0"/>
+              <a:t> catálogos,</a:t>
+            </a:r>
+          </a:p>
+          <a:p>
+            <a:r>
+              <a:rPr lang="es-MX" dirty="0"/>
+              <a:t>Modelos: lógica de programación y la persistencia de BD</a:t>
+            </a:r>
+          </a:p>
+          <a:p>
+            <a:r>
+              <a:rPr lang="es-MX" dirty="0"/>
+              <a:t>Diseño de BD (Workbench)</a:t>
+            </a:r>
+          </a:p>
+          <a:p>
+            <a:r>
+              <a:rPr lang="es-MX" dirty="0"/>
+              <a:t>Consumir los servicios del back, tanto en el </a:t>
+            </a:r>
+            <a:r>
+              <a:rPr lang="es-MX" dirty="0" err="1"/>
+              <a:t>front</a:t>
+            </a:r>
+            <a:r>
+              <a:rPr lang="es-MX" dirty="0"/>
+              <a:t> como en otros programas, (</a:t>
+            </a:r>
+            <a:r>
+              <a:rPr lang="es-MX" dirty="0" err="1"/>
+              <a:t>postman</a:t>
+            </a:r>
+            <a:r>
+              <a:rPr lang="es-MX" dirty="0"/>
+              <a:t>)</a:t>
+            </a:r>
+          </a:p>
+        </p:txBody>
+      </p:sp>
+    </p:spTree>
+    <p:extLst>
+      <p:ext uri="{BB962C8B-B14F-4D97-AF65-F5344CB8AC3E}">
+        <p14:creationId xmlns:p14="http://schemas.microsoft.com/office/powerpoint/2010/main" val="3570597189"/>
+      </p:ext>
+    </p:extLst>
+  </p:cSld>
+  <p:clrMapOvr>
+    <a:masterClrMapping/>
+  </p:clrMapOvr>
+</p:sld>
+</file>
+
 <file path=ppt/slides/slide2.xml><?xml version="1.0" encoding="utf-8"?>
 <p:sld xmlns:a="http://schemas.openxmlformats.org/drawingml/2006/main" xmlns:r="http://schemas.openxmlformats.org/officeDocument/2006/relationships" xmlns:p="http://schemas.openxmlformats.org/presentationml/2006/main">
   <p:cSld>

</xml_diff>

<commit_message>
quinto commit del curso de capacitacion de formación dual uptx
</commit_message>
<xml_diff>
--- a/actividades/Desarrollo Web.pptx
+++ b/actividades/Desarrollo Web.pptx
@@ -17,6 +17,7 @@
     <p:sldId id="265" r:id="rId11"/>
     <p:sldId id="266" r:id="rId12"/>
     <p:sldId id="267" r:id="rId13"/>
+    <p:sldId id="268" r:id="rId14"/>
   </p:sldIdLst>
   <p:sldSz cx="12192000" cy="6858000"/>
   <p:notesSz cx="6858000" cy="9144000"/>
@@ -272,7 +273,7 @@
           <a:p>
             <a:fld id="{93B37B95-31F0-458D-A6E3-84E44F6CE409}" type="datetimeFigureOut">
               <a:rPr lang="es-MX" smtClean="0"/>
-              <a:t>23/06/2022</a:t>
+              <a:t>27/06/2022</a:t>
             </a:fld>
             <a:endParaRPr lang="es-MX"/>
           </a:p>
@@ -472,7 +473,7 @@
           <a:p>
             <a:fld id="{93B37B95-31F0-458D-A6E3-84E44F6CE409}" type="datetimeFigureOut">
               <a:rPr lang="es-MX" smtClean="0"/>
-              <a:t>23/06/2022</a:t>
+              <a:t>27/06/2022</a:t>
             </a:fld>
             <a:endParaRPr lang="es-MX"/>
           </a:p>
@@ -682,7 +683,7 @@
           <a:p>
             <a:fld id="{93B37B95-31F0-458D-A6E3-84E44F6CE409}" type="datetimeFigureOut">
               <a:rPr lang="es-MX" smtClean="0"/>
-              <a:t>23/06/2022</a:t>
+              <a:t>27/06/2022</a:t>
             </a:fld>
             <a:endParaRPr lang="es-MX"/>
           </a:p>
@@ -882,7 +883,7 @@
           <a:p>
             <a:fld id="{93B37B95-31F0-458D-A6E3-84E44F6CE409}" type="datetimeFigureOut">
               <a:rPr lang="es-MX" smtClean="0"/>
-              <a:t>23/06/2022</a:t>
+              <a:t>27/06/2022</a:t>
             </a:fld>
             <a:endParaRPr lang="es-MX"/>
           </a:p>
@@ -1158,7 +1159,7 @@
           <a:p>
             <a:fld id="{93B37B95-31F0-458D-A6E3-84E44F6CE409}" type="datetimeFigureOut">
               <a:rPr lang="es-MX" smtClean="0"/>
-              <a:t>23/06/2022</a:t>
+              <a:t>27/06/2022</a:t>
             </a:fld>
             <a:endParaRPr lang="es-MX"/>
           </a:p>
@@ -1426,7 +1427,7 @@
           <a:p>
             <a:fld id="{93B37B95-31F0-458D-A6E3-84E44F6CE409}" type="datetimeFigureOut">
               <a:rPr lang="es-MX" smtClean="0"/>
-              <a:t>23/06/2022</a:t>
+              <a:t>27/06/2022</a:t>
             </a:fld>
             <a:endParaRPr lang="es-MX"/>
           </a:p>
@@ -1841,7 +1842,7 @@
           <a:p>
             <a:fld id="{93B37B95-31F0-458D-A6E3-84E44F6CE409}" type="datetimeFigureOut">
               <a:rPr lang="es-MX" smtClean="0"/>
-              <a:t>23/06/2022</a:t>
+              <a:t>27/06/2022</a:t>
             </a:fld>
             <a:endParaRPr lang="es-MX"/>
           </a:p>
@@ -1983,7 +1984,7 @@
           <a:p>
             <a:fld id="{93B37B95-31F0-458D-A6E3-84E44F6CE409}" type="datetimeFigureOut">
               <a:rPr lang="es-MX" smtClean="0"/>
-              <a:t>23/06/2022</a:t>
+              <a:t>27/06/2022</a:t>
             </a:fld>
             <a:endParaRPr lang="es-MX"/>
           </a:p>
@@ -2096,7 +2097,7 @@
           <a:p>
             <a:fld id="{93B37B95-31F0-458D-A6E3-84E44F6CE409}" type="datetimeFigureOut">
               <a:rPr lang="es-MX" smtClean="0"/>
-              <a:t>23/06/2022</a:t>
+              <a:t>27/06/2022</a:t>
             </a:fld>
             <a:endParaRPr lang="es-MX"/>
           </a:p>
@@ -2409,7 +2410,7 @@
           <a:p>
             <a:fld id="{93B37B95-31F0-458D-A6E3-84E44F6CE409}" type="datetimeFigureOut">
               <a:rPr lang="es-MX" smtClean="0"/>
-              <a:t>23/06/2022</a:t>
+              <a:t>27/06/2022</a:t>
             </a:fld>
             <a:endParaRPr lang="es-MX"/>
           </a:p>
@@ -2698,7 +2699,7 @@
           <a:p>
             <a:fld id="{93B37B95-31F0-458D-A6E3-84E44F6CE409}" type="datetimeFigureOut">
               <a:rPr lang="es-MX" smtClean="0"/>
-              <a:t>23/06/2022</a:t>
+              <a:t>27/06/2022</a:t>
             </a:fld>
             <a:endParaRPr lang="es-MX"/>
           </a:p>
@@ -2941,7 +2942,7 @@
           <a:p>
             <a:fld id="{93B37B95-31F0-458D-A6E3-84E44F6CE409}" type="datetimeFigureOut">
               <a:rPr lang="es-MX" smtClean="0"/>
-              <a:t>23/06/2022</a:t>
+              <a:t>27/06/2022</a:t>
             </a:fld>
             <a:endParaRPr lang="es-MX"/>
           </a:p>
@@ -3694,8 +3695,13 @@
             </a:r>
             <a:r>
               <a:rPr lang="es-MX" dirty="0"/>
-              <a:t> de las operaciones decide hacia que modelo, captcha, validaciones campos</a:t>
-            </a:r>
+              <a:t> de las operaciones decide hacia que modelo, captcha, validaciones campos y devuelve la vista correspondiente de la </a:t>
+            </a:r>
+            <a:r>
+              <a:rPr lang="es-MX" dirty="0" err="1"/>
+              <a:t>peticion</a:t>
+            </a:r>
+            <a:endParaRPr lang="es-MX" dirty="0"/>
           </a:p>
           <a:p>
             <a:r>
@@ -3830,7 +3836,9 @@
           </a:xfrm>
         </p:spPr>
         <p:txBody>
-          <a:bodyPr/>
+          <a:bodyPr>
+            <a:normAutofit lnSpcReduction="10000"/>
+          </a:bodyPr>
           <a:lstStyle/>
           <a:p>
             <a:r>
@@ -3897,6 +3905,45 @@
             <a:r>
               <a:rPr lang="es-MX" dirty="0"/>
               <a:t>)</a:t>
+            </a:r>
+          </a:p>
+          <a:p>
+            <a:r>
+              <a:rPr lang="es-MX" dirty="0"/>
+              <a:t>Respuestas del back:</a:t>
+            </a:r>
+          </a:p>
+          <a:p>
+            <a:pPr lvl="1"/>
+            <a:r>
+              <a:rPr lang="es-MX" dirty="0"/>
+              <a:t>Status: true/false</a:t>
+            </a:r>
+          </a:p>
+          <a:p>
+            <a:pPr lvl="1"/>
+            <a:r>
+              <a:rPr lang="es-MX" dirty="0" err="1"/>
+              <a:t>Msg</a:t>
+            </a:r>
+            <a:r>
+              <a:rPr lang="es-MX" dirty="0"/>
+              <a:t>: arreglo de mensajes de las operaciones; por </a:t>
+            </a:r>
+            <a:r>
+              <a:rPr lang="es-MX" dirty="0" err="1"/>
+              <a:t>ej</a:t>
+            </a:r>
+            <a:r>
+              <a:rPr lang="es-MX" dirty="0"/>
+              <a:t>: se obtuvo el listado correctamente, se actualizo el registro con éxito, no se pudo eliminar el registro</a:t>
+            </a:r>
+          </a:p>
+          <a:p>
+            <a:pPr lvl="1"/>
+            <a:r>
+              <a:rPr lang="es-MX" dirty="0"/>
+              <a:t>Data (opcional): contiene la información del back, listado de catalogo, un registro de alguna tabla, etc.</a:t>
             </a:r>
           </a:p>
         </p:txBody>
@@ -3905,6 +3952,120 @@
     <p:extLst>
       <p:ext uri="{BB962C8B-B14F-4D97-AF65-F5344CB8AC3E}">
         <p14:creationId xmlns:p14="http://schemas.microsoft.com/office/powerpoint/2010/main" val="3570597189"/>
+      </p:ext>
+    </p:extLst>
+  </p:cSld>
+  <p:clrMapOvr>
+    <a:masterClrMapping/>
+  </p:clrMapOvr>
+</p:sld>
+</file>
+
+<file path=ppt/slides/slide13.xml><?xml version="1.0" encoding="utf-8"?>
+<p:sld xmlns:a="http://schemas.openxmlformats.org/drawingml/2006/main" xmlns:r="http://schemas.openxmlformats.org/officeDocument/2006/relationships" xmlns:p="http://schemas.openxmlformats.org/presentationml/2006/main">
+  <p:cSld>
+    <p:spTree>
+      <p:nvGrpSpPr>
+        <p:cNvPr id="1" name=""/>
+        <p:cNvGrpSpPr/>
+        <p:nvPr/>
+      </p:nvGrpSpPr>
+      <p:grpSpPr>
+        <a:xfrm>
+          <a:off x="0" y="0"/>
+          <a:ext cx="0" cy="0"/>
+          <a:chOff x="0" y="0"/>
+          <a:chExt cx="0" cy="0"/>
+        </a:xfrm>
+      </p:grpSpPr>
+      <p:sp>
+        <p:nvSpPr>
+          <p:cNvPr id="2" name="Título 1">
+            <a:extLst>
+              <a:ext uri="{FF2B5EF4-FFF2-40B4-BE49-F238E27FC236}">
+                <a16:creationId xmlns:a16="http://schemas.microsoft.com/office/drawing/2014/main" id="{AEF9D653-5FA7-CF3C-EB6B-E7F170ABE492}"/>
+              </a:ext>
+            </a:extLst>
+          </p:cNvPr>
+          <p:cNvSpPr>
+            <a:spLocks noGrp="1"/>
+          </p:cNvSpPr>
+          <p:nvPr>
+            <p:ph type="title"/>
+          </p:nvPr>
+        </p:nvSpPr>
+        <p:spPr/>
+        <p:txBody>
+          <a:bodyPr/>
+          <a:lstStyle/>
+          <a:p>
+            <a:r>
+              <a:rPr lang="es-MX" dirty="0" err="1"/>
+              <a:t>investigacion</a:t>
+            </a:r>
+            <a:endParaRPr lang="es-MX" dirty="0"/>
+          </a:p>
+        </p:txBody>
+      </p:sp>
+      <p:sp>
+        <p:nvSpPr>
+          <p:cNvPr id="3" name="Marcador de contenido 2">
+            <a:extLst>
+              <a:ext uri="{FF2B5EF4-FFF2-40B4-BE49-F238E27FC236}">
+                <a16:creationId xmlns:a16="http://schemas.microsoft.com/office/drawing/2014/main" id="{EA7EF1B7-9BA7-E84E-F84E-161B00D053DE}"/>
+              </a:ext>
+            </a:extLst>
+          </p:cNvPr>
+          <p:cNvSpPr>
+            <a:spLocks noGrp="1"/>
+          </p:cNvSpPr>
+          <p:nvPr>
+            <p:ph idx="1"/>
+          </p:nvPr>
+        </p:nvSpPr>
+        <p:spPr/>
+        <p:txBody>
+          <a:bodyPr/>
+          <a:lstStyle/>
+          <a:p>
+            <a:r>
+              <a:rPr lang="es-MX" dirty="0"/>
+              <a:t>Rutas relativas</a:t>
+            </a:r>
+          </a:p>
+          <a:p>
+            <a:r>
+              <a:rPr lang="es-MX" dirty="0"/>
+              <a:t>Rutas absolutas</a:t>
+            </a:r>
+          </a:p>
+          <a:p>
+            <a:r>
+              <a:rPr lang="es-MX" dirty="0" err="1"/>
+              <a:t>Codigos</a:t>
+            </a:r>
+            <a:r>
+              <a:rPr lang="es-MX" dirty="0"/>
+              <a:t> de respuesta http</a:t>
+            </a:r>
+          </a:p>
+          <a:p>
+            <a:r>
+              <a:rPr lang="es-MX" dirty="0"/>
+              <a:t>Revisión del proyecto y tratar de integrar en servicio el otro catalogo de películas </a:t>
+            </a:r>
+            <a:r>
+              <a:rPr lang="es-MX"/>
+              <a:t>(clasificación)</a:t>
+            </a:r>
+            <a:endParaRPr lang="es-MX" dirty="0"/>
+          </a:p>
+        </p:txBody>
+      </p:sp>
+    </p:spTree>
+    <p:extLst>
+      <p:ext uri="{BB962C8B-B14F-4D97-AF65-F5344CB8AC3E}">
+        <p14:creationId xmlns:p14="http://schemas.microsoft.com/office/powerpoint/2010/main" val="1735973992"/>
       </p:ext>
     </p:extLst>
   </p:cSld>

</xml_diff>

<commit_message>
sexto commit del curso de capacitacion de formación dual uptx
</commit_message>
<xml_diff>
--- a/actividades/Desarrollo Web.pptx
+++ b/actividades/Desarrollo Web.pptx
@@ -273,7 +273,7 @@
           <a:p>
             <a:fld id="{93B37B95-31F0-458D-A6E3-84E44F6CE409}" type="datetimeFigureOut">
               <a:rPr lang="es-MX" smtClean="0"/>
-              <a:t>27/06/2022</a:t>
+              <a:t>28/06/2022</a:t>
             </a:fld>
             <a:endParaRPr lang="es-MX"/>
           </a:p>
@@ -473,7 +473,7 @@
           <a:p>
             <a:fld id="{93B37B95-31F0-458D-A6E3-84E44F6CE409}" type="datetimeFigureOut">
               <a:rPr lang="es-MX" smtClean="0"/>
-              <a:t>27/06/2022</a:t>
+              <a:t>28/06/2022</a:t>
             </a:fld>
             <a:endParaRPr lang="es-MX"/>
           </a:p>
@@ -683,7 +683,7 @@
           <a:p>
             <a:fld id="{93B37B95-31F0-458D-A6E3-84E44F6CE409}" type="datetimeFigureOut">
               <a:rPr lang="es-MX" smtClean="0"/>
-              <a:t>27/06/2022</a:t>
+              <a:t>28/06/2022</a:t>
             </a:fld>
             <a:endParaRPr lang="es-MX"/>
           </a:p>
@@ -883,7 +883,7 @@
           <a:p>
             <a:fld id="{93B37B95-31F0-458D-A6E3-84E44F6CE409}" type="datetimeFigureOut">
               <a:rPr lang="es-MX" smtClean="0"/>
-              <a:t>27/06/2022</a:t>
+              <a:t>28/06/2022</a:t>
             </a:fld>
             <a:endParaRPr lang="es-MX"/>
           </a:p>
@@ -1159,7 +1159,7 @@
           <a:p>
             <a:fld id="{93B37B95-31F0-458D-A6E3-84E44F6CE409}" type="datetimeFigureOut">
               <a:rPr lang="es-MX" smtClean="0"/>
-              <a:t>27/06/2022</a:t>
+              <a:t>28/06/2022</a:t>
             </a:fld>
             <a:endParaRPr lang="es-MX"/>
           </a:p>
@@ -1427,7 +1427,7 @@
           <a:p>
             <a:fld id="{93B37B95-31F0-458D-A6E3-84E44F6CE409}" type="datetimeFigureOut">
               <a:rPr lang="es-MX" smtClean="0"/>
-              <a:t>27/06/2022</a:t>
+              <a:t>28/06/2022</a:t>
             </a:fld>
             <a:endParaRPr lang="es-MX"/>
           </a:p>
@@ -1842,7 +1842,7 @@
           <a:p>
             <a:fld id="{93B37B95-31F0-458D-A6E3-84E44F6CE409}" type="datetimeFigureOut">
               <a:rPr lang="es-MX" smtClean="0"/>
-              <a:t>27/06/2022</a:t>
+              <a:t>28/06/2022</a:t>
             </a:fld>
             <a:endParaRPr lang="es-MX"/>
           </a:p>
@@ -1984,7 +1984,7 @@
           <a:p>
             <a:fld id="{93B37B95-31F0-458D-A6E3-84E44F6CE409}" type="datetimeFigureOut">
               <a:rPr lang="es-MX" smtClean="0"/>
-              <a:t>27/06/2022</a:t>
+              <a:t>28/06/2022</a:t>
             </a:fld>
             <a:endParaRPr lang="es-MX"/>
           </a:p>
@@ -2097,7 +2097,7 @@
           <a:p>
             <a:fld id="{93B37B95-31F0-458D-A6E3-84E44F6CE409}" type="datetimeFigureOut">
               <a:rPr lang="es-MX" smtClean="0"/>
-              <a:t>27/06/2022</a:t>
+              <a:t>28/06/2022</a:t>
             </a:fld>
             <a:endParaRPr lang="es-MX"/>
           </a:p>
@@ -2410,7 +2410,7 @@
           <a:p>
             <a:fld id="{93B37B95-31F0-458D-A6E3-84E44F6CE409}" type="datetimeFigureOut">
               <a:rPr lang="es-MX" smtClean="0"/>
-              <a:t>27/06/2022</a:t>
+              <a:t>28/06/2022</a:t>
             </a:fld>
             <a:endParaRPr lang="es-MX"/>
           </a:p>
@@ -2699,7 +2699,7 @@
           <a:p>
             <a:fld id="{93B37B95-31F0-458D-A6E3-84E44F6CE409}" type="datetimeFigureOut">
               <a:rPr lang="es-MX" smtClean="0"/>
-              <a:t>27/06/2022</a:t>
+              <a:t>28/06/2022</a:t>
             </a:fld>
             <a:endParaRPr lang="es-MX"/>
           </a:p>
@@ -2942,7 +2942,7 @@
           <a:p>
             <a:fld id="{93B37B95-31F0-458D-A6E3-84E44F6CE409}" type="datetimeFigureOut">
               <a:rPr lang="es-MX" smtClean="0"/>
-              <a:t>27/06/2022</a:t>
+              <a:t>28/06/2022</a:t>
             </a:fld>
             <a:endParaRPr lang="es-MX"/>
           </a:p>
@@ -4025,7 +4025,9 @@
         </p:nvSpPr>
         <p:spPr/>
         <p:txBody>
-          <a:bodyPr/>
+          <a:bodyPr>
+            <a:normAutofit fontScale="92500" lnSpcReduction="10000"/>
+          </a:bodyPr>
           <a:lstStyle/>
           <a:p>
             <a:r>
@@ -4052,11 +4054,38 @@
           <a:p>
             <a:r>
               <a:rPr lang="es-MX" dirty="0"/>
-              <a:t>Revisión del proyecto y tratar de integrar en servicio el otro catalogo de películas </a:t>
+              <a:t>Revisión del proyecto y tratar de integrar en servicio el otro catalogo de películas (clasificación)</a:t>
+            </a:r>
+          </a:p>
+          <a:p>
+            <a:endParaRPr lang="es-MX" dirty="0"/>
+          </a:p>
+          <a:p>
+            <a:r>
+              <a:rPr lang="es-MX" dirty="0"/>
+              <a:t>28-jun (6ta sesión)</a:t>
+            </a:r>
+          </a:p>
+          <a:p>
+            <a:r>
+              <a:rPr lang="es-MX" dirty="0"/>
+              <a:t>Investigar las peticiones http</a:t>
+            </a:r>
+          </a:p>
+          <a:p>
+            <a:r>
+              <a:rPr lang="es-MX" dirty="0"/>
+              <a:t>Investigar funciones anónimas</a:t>
+            </a:r>
+          </a:p>
+          <a:p>
+            <a:r>
+              <a:rPr lang="es-MX" dirty="0"/>
+              <a:t>Aplicar el AJAX para el catalogo de categoría y para el tablero de </a:t>
             </a:r>
             <a:r>
               <a:rPr lang="es-MX"/>
-              <a:t>(clasificación)</a:t>
+              <a:t>peliculas</a:t>
             </a:r>
             <a:endParaRPr lang="es-MX" dirty="0"/>
           </a:p>

</xml_diff>

<commit_message>
ultima sesion de capacitacion formacion dual
</commit_message>
<xml_diff>
--- a/actividades/Desarrollo Web.pptx
+++ b/actividades/Desarrollo Web.pptx
@@ -18,6 +18,7 @@
     <p:sldId id="266" r:id="rId12"/>
     <p:sldId id="267" r:id="rId13"/>
     <p:sldId id="268" r:id="rId14"/>
+    <p:sldId id="269" r:id="rId15"/>
   </p:sldIdLst>
   <p:sldSz cx="12192000" cy="6858000"/>
   <p:notesSz cx="6858000" cy="9144000"/>
@@ -273,7 +274,7 @@
           <a:p>
             <a:fld id="{93B37B95-31F0-458D-A6E3-84E44F6CE409}" type="datetimeFigureOut">
               <a:rPr lang="es-MX" smtClean="0"/>
-              <a:t>28/06/2022</a:t>
+              <a:t>29/06/2022</a:t>
             </a:fld>
             <a:endParaRPr lang="es-MX"/>
           </a:p>
@@ -473,7 +474,7 @@
           <a:p>
             <a:fld id="{93B37B95-31F0-458D-A6E3-84E44F6CE409}" type="datetimeFigureOut">
               <a:rPr lang="es-MX" smtClean="0"/>
-              <a:t>28/06/2022</a:t>
+              <a:t>29/06/2022</a:t>
             </a:fld>
             <a:endParaRPr lang="es-MX"/>
           </a:p>
@@ -683,7 +684,7 @@
           <a:p>
             <a:fld id="{93B37B95-31F0-458D-A6E3-84E44F6CE409}" type="datetimeFigureOut">
               <a:rPr lang="es-MX" smtClean="0"/>
-              <a:t>28/06/2022</a:t>
+              <a:t>29/06/2022</a:t>
             </a:fld>
             <a:endParaRPr lang="es-MX"/>
           </a:p>
@@ -883,7 +884,7 @@
           <a:p>
             <a:fld id="{93B37B95-31F0-458D-A6E3-84E44F6CE409}" type="datetimeFigureOut">
               <a:rPr lang="es-MX" smtClean="0"/>
-              <a:t>28/06/2022</a:t>
+              <a:t>29/06/2022</a:t>
             </a:fld>
             <a:endParaRPr lang="es-MX"/>
           </a:p>
@@ -1159,7 +1160,7 @@
           <a:p>
             <a:fld id="{93B37B95-31F0-458D-A6E3-84E44F6CE409}" type="datetimeFigureOut">
               <a:rPr lang="es-MX" smtClean="0"/>
-              <a:t>28/06/2022</a:t>
+              <a:t>29/06/2022</a:t>
             </a:fld>
             <a:endParaRPr lang="es-MX"/>
           </a:p>
@@ -1427,7 +1428,7 @@
           <a:p>
             <a:fld id="{93B37B95-31F0-458D-A6E3-84E44F6CE409}" type="datetimeFigureOut">
               <a:rPr lang="es-MX" smtClean="0"/>
-              <a:t>28/06/2022</a:t>
+              <a:t>29/06/2022</a:t>
             </a:fld>
             <a:endParaRPr lang="es-MX"/>
           </a:p>
@@ -1842,7 +1843,7 @@
           <a:p>
             <a:fld id="{93B37B95-31F0-458D-A6E3-84E44F6CE409}" type="datetimeFigureOut">
               <a:rPr lang="es-MX" smtClean="0"/>
-              <a:t>28/06/2022</a:t>
+              <a:t>29/06/2022</a:t>
             </a:fld>
             <a:endParaRPr lang="es-MX"/>
           </a:p>
@@ -1984,7 +1985,7 @@
           <a:p>
             <a:fld id="{93B37B95-31F0-458D-A6E3-84E44F6CE409}" type="datetimeFigureOut">
               <a:rPr lang="es-MX" smtClean="0"/>
-              <a:t>28/06/2022</a:t>
+              <a:t>29/06/2022</a:t>
             </a:fld>
             <a:endParaRPr lang="es-MX"/>
           </a:p>
@@ -2097,7 +2098,7 @@
           <a:p>
             <a:fld id="{93B37B95-31F0-458D-A6E3-84E44F6CE409}" type="datetimeFigureOut">
               <a:rPr lang="es-MX" smtClean="0"/>
-              <a:t>28/06/2022</a:t>
+              <a:t>29/06/2022</a:t>
             </a:fld>
             <a:endParaRPr lang="es-MX"/>
           </a:p>
@@ -2410,7 +2411,7 @@
           <a:p>
             <a:fld id="{93B37B95-31F0-458D-A6E3-84E44F6CE409}" type="datetimeFigureOut">
               <a:rPr lang="es-MX" smtClean="0"/>
-              <a:t>28/06/2022</a:t>
+              <a:t>29/06/2022</a:t>
             </a:fld>
             <a:endParaRPr lang="es-MX"/>
           </a:p>
@@ -2699,7 +2700,7 @@
           <a:p>
             <a:fld id="{93B37B95-31F0-458D-A6E3-84E44F6CE409}" type="datetimeFigureOut">
               <a:rPr lang="es-MX" smtClean="0"/>
-              <a:t>28/06/2022</a:t>
+              <a:t>29/06/2022</a:t>
             </a:fld>
             <a:endParaRPr lang="es-MX"/>
           </a:p>
@@ -2942,7 +2943,7 @@
           <a:p>
             <a:fld id="{93B37B95-31F0-458D-A6E3-84E44F6CE409}" type="datetimeFigureOut">
               <a:rPr lang="es-MX" smtClean="0"/>
-              <a:t>28/06/2022</a:t>
+              <a:t>29/06/2022</a:t>
             </a:fld>
             <a:endParaRPr lang="es-MX"/>
           </a:p>
@@ -4104,6 +4105,93 @@
 </p:sld>
 </file>
 
+<file path=ppt/slides/slide14.xml><?xml version="1.0" encoding="utf-8"?>
+<p:sld xmlns:a="http://schemas.openxmlformats.org/drawingml/2006/main" xmlns:r="http://schemas.openxmlformats.org/officeDocument/2006/relationships" xmlns:p="http://schemas.openxmlformats.org/presentationml/2006/main">
+  <p:cSld>
+    <p:spTree>
+      <p:nvGrpSpPr>
+        <p:cNvPr id="1" name=""/>
+        <p:cNvGrpSpPr/>
+        <p:nvPr/>
+      </p:nvGrpSpPr>
+      <p:grpSpPr>
+        <a:xfrm>
+          <a:off x="0" y="0"/>
+          <a:ext cx="0" cy="0"/>
+          <a:chOff x="0" y="0"/>
+          <a:chExt cx="0" cy="0"/>
+        </a:xfrm>
+      </p:grpSpPr>
+      <p:sp>
+        <p:nvSpPr>
+          <p:cNvPr id="2" name="Título 1">
+            <a:extLst>
+              <a:ext uri="{FF2B5EF4-FFF2-40B4-BE49-F238E27FC236}">
+                <a16:creationId xmlns:a16="http://schemas.microsoft.com/office/drawing/2014/main" id="{AE009A38-01F7-3D48-560B-156563B3F88F}"/>
+              </a:ext>
+            </a:extLst>
+          </p:cNvPr>
+          <p:cNvSpPr>
+            <a:spLocks noGrp="1"/>
+          </p:cNvSpPr>
+          <p:nvPr>
+            <p:ph type="title"/>
+          </p:nvPr>
+        </p:nvSpPr>
+        <p:spPr/>
+        <p:txBody>
+          <a:bodyPr/>
+          <a:lstStyle/>
+          <a:p>
+            <a:endParaRPr lang="es-MX" dirty="0"/>
+          </a:p>
+        </p:txBody>
+      </p:sp>
+      <p:sp>
+        <p:nvSpPr>
+          <p:cNvPr id="3" name="Marcador de contenido 2">
+            <a:extLst>
+              <a:ext uri="{FF2B5EF4-FFF2-40B4-BE49-F238E27FC236}">
+                <a16:creationId xmlns:a16="http://schemas.microsoft.com/office/drawing/2014/main" id="{7E95A8C8-8CD6-9878-BD20-A25458891635}"/>
+              </a:ext>
+            </a:extLst>
+          </p:cNvPr>
+          <p:cNvSpPr>
+            <a:spLocks noGrp="1"/>
+          </p:cNvSpPr>
+          <p:nvPr>
+            <p:ph idx="1"/>
+          </p:nvPr>
+        </p:nvSpPr>
+        <p:spPr/>
+        <p:txBody>
+          <a:bodyPr/>
+          <a:lstStyle/>
+          <a:p>
+            <a:r>
+              <a:rPr lang="es-MX" dirty="0"/>
+              <a:t>Verificar como validar un formulario desde JS (hacer uso de librerías, </a:t>
+            </a:r>
+            <a:r>
+              <a:rPr lang="es-MX"/>
+              <a:t>jqueryValidate)</a:t>
+            </a:r>
+          </a:p>
+        </p:txBody>
+      </p:sp>
+    </p:spTree>
+    <p:extLst>
+      <p:ext uri="{BB962C8B-B14F-4D97-AF65-F5344CB8AC3E}">
+        <p14:creationId xmlns:p14="http://schemas.microsoft.com/office/powerpoint/2010/main" val="3594332451"/>
+      </p:ext>
+    </p:extLst>
+  </p:cSld>
+  <p:clrMapOvr>
+    <a:masterClrMapping/>
+  </p:clrMapOvr>
+</p:sld>
+</file>
+
 <file path=ppt/slides/slide2.xml><?xml version="1.0" encoding="utf-8"?>
 <p:sld xmlns:a="http://schemas.openxmlformats.org/drawingml/2006/main" xmlns:r="http://schemas.openxmlformats.org/officeDocument/2006/relationships" xmlns:p="http://schemas.openxmlformats.org/presentationml/2006/main">
   <p:cSld>

</xml_diff>